<commit_message>
added peoples page for advisor, labmate, special thanks
</commit_message>
<xml_diff>
--- a/images/src/cliparts.pptx
+++ b/images/src/cliparts.pptx
@@ -106,6 +106,11 @@
       </a:defRPr>
     </a:lvl9pPr>
   </p:defaultTextStyle>
+  <p:extLst>
+    <p:ext uri="{EFAFB233-063F-42B5-8137-9DF3F51BA10A}">
+      <p15:sldGuideLst xmlns:p15="http://schemas.microsoft.com/office/powerpoint/2012/main"/>
+    </p:ext>
+  </p:extLst>
 </p:presentation>
 </file>
 
@@ -5235,6 +5240,45 @@
           </a:prstGeom>
         </p:spPr>
       </p:pic>
+      <p:pic>
+        <p:nvPicPr>
+          <p:cNvPr id="3" name="Graphic 2" descr="Hibiscus outline">
+            <a:extLst>
+              <a:ext uri="{FF2B5EF4-FFF2-40B4-BE49-F238E27FC236}">
+                <a16:creationId xmlns:a16="http://schemas.microsoft.com/office/drawing/2014/main" id="{8214ABC0-6C20-EF8B-A11B-77E4168F21B0}"/>
+              </a:ext>
+            </a:extLst>
+          </p:cNvPr>
+          <p:cNvPicPr>
+            <a:picLocks noChangeAspect="1"/>
+          </p:cNvPicPr>
+          <p:nvPr/>
+        </p:nvPicPr>
+        <p:blipFill>
+          <a:blip r:embed="rId10">
+            <a:extLst>
+              <a:ext uri="{28A0092B-C50C-407E-A947-70E740481C1C}">
+                <a14:useLocalDpi xmlns:a14="http://schemas.microsoft.com/office/drawing/2010/main" val="0"/>
+              </a:ext>
+              <a:ext uri="{96DAC541-7B7A-43D3-8B79-37D633B846F1}">
+                <asvg:svgBlip xmlns:asvg="http://schemas.microsoft.com/office/drawing/2016/SVG/main" r:embed="rId11"/>
+              </a:ext>
+            </a:extLst>
+          </a:blip>
+          <a:stretch>
+            <a:fillRect/>
+          </a:stretch>
+        </p:blipFill>
+        <p:spPr>
+          <a:xfrm>
+            <a:off x="4244109" y="1253836"/>
+            <a:ext cx="914400" cy="914400"/>
+          </a:xfrm>
+          <a:prstGeom prst="rect">
+            <a:avLst/>
+          </a:prstGeom>
+        </p:spPr>
+      </p:pic>
     </p:spTree>
     <p:extLst>
       <p:ext uri="{BB962C8B-B14F-4D97-AF65-F5344CB8AC3E}">

</xml_diff>

<commit_message>
updated DNN figure to be easier to read
</commit_message>
<xml_diff>
--- a/images/src/cliparts.pptx
+++ b/images/src/cliparts.pptx
@@ -261,7 +261,7 @@
           <a:p>
             <a:fld id="{030E8E6B-5E7B-4B7B-BC20-E6C56F6F42C4}" type="datetimeFigureOut">
               <a:rPr lang="en-GB" smtClean="0"/>
-              <a:t>14/10/2023</a:t>
+              <a:t>31/10/2023</a:t>
             </a:fld>
             <a:endParaRPr lang="en-GB"/>
           </a:p>
@@ -459,7 +459,7 @@
           <a:p>
             <a:fld id="{030E8E6B-5E7B-4B7B-BC20-E6C56F6F42C4}" type="datetimeFigureOut">
               <a:rPr lang="en-GB" smtClean="0"/>
-              <a:t>14/10/2023</a:t>
+              <a:t>31/10/2023</a:t>
             </a:fld>
             <a:endParaRPr lang="en-GB"/>
           </a:p>
@@ -667,7 +667,7 @@
           <a:p>
             <a:fld id="{030E8E6B-5E7B-4B7B-BC20-E6C56F6F42C4}" type="datetimeFigureOut">
               <a:rPr lang="en-GB" smtClean="0"/>
-              <a:t>14/10/2023</a:t>
+              <a:t>31/10/2023</a:t>
             </a:fld>
             <a:endParaRPr lang="en-GB"/>
           </a:p>
@@ -865,7 +865,7 @@
           <a:p>
             <a:fld id="{030E8E6B-5E7B-4B7B-BC20-E6C56F6F42C4}" type="datetimeFigureOut">
               <a:rPr lang="en-GB" smtClean="0"/>
-              <a:t>14/10/2023</a:t>
+              <a:t>31/10/2023</a:t>
             </a:fld>
             <a:endParaRPr lang="en-GB"/>
           </a:p>
@@ -1140,7 +1140,7 @@
           <a:p>
             <a:fld id="{030E8E6B-5E7B-4B7B-BC20-E6C56F6F42C4}" type="datetimeFigureOut">
               <a:rPr lang="en-GB" smtClean="0"/>
-              <a:t>14/10/2023</a:t>
+              <a:t>31/10/2023</a:t>
             </a:fld>
             <a:endParaRPr lang="en-GB"/>
           </a:p>
@@ -1405,7 +1405,7 @@
           <a:p>
             <a:fld id="{030E8E6B-5E7B-4B7B-BC20-E6C56F6F42C4}" type="datetimeFigureOut">
               <a:rPr lang="en-GB" smtClean="0"/>
-              <a:t>14/10/2023</a:t>
+              <a:t>31/10/2023</a:t>
             </a:fld>
             <a:endParaRPr lang="en-GB"/>
           </a:p>
@@ -1817,7 +1817,7 @@
           <a:p>
             <a:fld id="{030E8E6B-5E7B-4B7B-BC20-E6C56F6F42C4}" type="datetimeFigureOut">
               <a:rPr lang="en-GB" smtClean="0"/>
-              <a:t>14/10/2023</a:t>
+              <a:t>31/10/2023</a:t>
             </a:fld>
             <a:endParaRPr lang="en-GB"/>
           </a:p>
@@ -1958,7 +1958,7 @@
           <a:p>
             <a:fld id="{030E8E6B-5E7B-4B7B-BC20-E6C56F6F42C4}" type="datetimeFigureOut">
               <a:rPr lang="en-GB" smtClean="0"/>
-              <a:t>14/10/2023</a:t>
+              <a:t>31/10/2023</a:t>
             </a:fld>
             <a:endParaRPr lang="en-GB"/>
           </a:p>
@@ -2071,7 +2071,7 @@
           <a:p>
             <a:fld id="{030E8E6B-5E7B-4B7B-BC20-E6C56F6F42C4}" type="datetimeFigureOut">
               <a:rPr lang="en-GB" smtClean="0"/>
-              <a:t>14/10/2023</a:t>
+              <a:t>31/10/2023</a:t>
             </a:fld>
             <a:endParaRPr lang="en-GB"/>
           </a:p>
@@ -2382,7 +2382,7 @@
           <a:p>
             <a:fld id="{030E8E6B-5E7B-4B7B-BC20-E6C56F6F42C4}" type="datetimeFigureOut">
               <a:rPr lang="en-GB" smtClean="0"/>
-              <a:t>14/10/2023</a:t>
+              <a:t>31/10/2023</a:t>
             </a:fld>
             <a:endParaRPr lang="en-GB"/>
           </a:p>
@@ -2670,7 +2670,7 @@
           <a:p>
             <a:fld id="{030E8E6B-5E7B-4B7B-BC20-E6C56F6F42C4}" type="datetimeFigureOut">
               <a:rPr lang="en-GB" smtClean="0"/>
-              <a:t>14/10/2023</a:t>
+              <a:t>31/10/2023</a:t>
             </a:fld>
             <a:endParaRPr lang="en-GB"/>
           </a:p>
@@ -2911,7 +2911,7 @@
           <a:p>
             <a:fld id="{030E8E6B-5E7B-4B7B-BC20-E6C56F6F42C4}" type="datetimeFigureOut">
               <a:rPr lang="en-GB" smtClean="0"/>
-              <a:t>14/10/2023</a:t>
+              <a:t>31/10/2023</a:t>
             </a:fld>
             <a:endParaRPr lang="en-GB"/>
           </a:p>
@@ -3856,7 +3856,11 @@
           <a:solidFill>
             <a:srgbClr val="FFFFFF"/>
           </a:solidFill>
-          <a:ln w="38100"/>
+          <a:ln w="101600">
+            <a:solidFill>
+              <a:srgbClr val="00B0F0"/>
+            </a:solidFill>
+          </a:ln>
         </p:spPr>
         <p:style>
           <a:lnRef idx="2">
@@ -3906,7 +3910,11 @@
           <a:solidFill>
             <a:srgbClr val="FFFFFF"/>
           </a:solidFill>
-          <a:ln w="38100"/>
+          <a:ln w="101600">
+            <a:solidFill>
+              <a:srgbClr val="00B0F0"/>
+            </a:solidFill>
+          </a:ln>
         </p:spPr>
         <p:style>
           <a:lnRef idx="2">
@@ -3956,7 +3964,11 @@
           <a:solidFill>
             <a:srgbClr val="FFFFFF"/>
           </a:solidFill>
-          <a:ln w="38100"/>
+          <a:ln w="101600">
+            <a:solidFill>
+              <a:srgbClr val="00B0F0"/>
+            </a:solidFill>
+          </a:ln>
         </p:spPr>
         <p:style>
           <a:lnRef idx="2">
@@ -3979,7 +3991,7 @@
           <a:lstStyle/>
           <a:p>
             <a:pPr algn="ctr"/>
-            <a:endParaRPr lang="en-GB"/>
+            <a:endParaRPr lang="en-GB" dirty="0"/>
           </a:p>
         </p:txBody>
       </p:sp>
@@ -4006,7 +4018,11 @@
           <a:solidFill>
             <a:srgbClr val="FFFFFF"/>
           </a:solidFill>
-          <a:ln w="38100"/>
+          <a:ln w="101600">
+            <a:solidFill>
+              <a:srgbClr val="00B0F0"/>
+            </a:solidFill>
+          </a:ln>
         </p:spPr>
         <p:style>
           <a:lnRef idx="2">
@@ -4056,7 +4072,11 @@
           <a:solidFill>
             <a:srgbClr val="FFFFFF"/>
           </a:solidFill>
-          <a:ln w="38100"/>
+          <a:ln w="101600">
+            <a:solidFill>
+              <a:srgbClr val="00B0F0"/>
+            </a:solidFill>
+          </a:ln>
         </p:spPr>
         <p:style>
           <a:lnRef idx="2">
@@ -4106,7 +4126,11 @@
           <a:solidFill>
             <a:srgbClr val="FFFFFF"/>
           </a:solidFill>
-          <a:ln w="38100"/>
+          <a:ln w="101600">
+            <a:solidFill>
+              <a:srgbClr val="00B0F0"/>
+            </a:solidFill>
+          </a:ln>
         </p:spPr>
         <p:style>
           <a:lnRef idx="2">
@@ -4156,7 +4180,11 @@
           <a:solidFill>
             <a:srgbClr val="FFFFFF"/>
           </a:solidFill>
-          <a:ln w="38100"/>
+          <a:ln w="101600">
+            <a:solidFill>
+              <a:srgbClr val="00B0F0"/>
+            </a:solidFill>
+          </a:ln>
         </p:spPr>
         <p:style>
           <a:lnRef idx="2">
@@ -4206,7 +4234,11 @@
           <a:solidFill>
             <a:srgbClr val="FFFFFF"/>
           </a:solidFill>
-          <a:ln w="38100"/>
+          <a:ln w="101600">
+            <a:solidFill>
+              <a:srgbClr val="00B0F0"/>
+            </a:solidFill>
+          </a:ln>
         </p:spPr>
         <p:style>
           <a:lnRef idx="2">
@@ -4256,7 +4288,11 @@
           <a:solidFill>
             <a:srgbClr val="FFFFFF"/>
           </a:solidFill>
-          <a:ln w="38100"/>
+          <a:ln w="101600">
+            <a:solidFill>
+              <a:srgbClr val="00B0F0"/>
+            </a:solidFill>
+          </a:ln>
         </p:spPr>
         <p:style>
           <a:lnRef idx="2">
@@ -4305,7 +4341,10 @@
           <a:prstGeom prst="straightConnector1">
             <a:avLst/>
           </a:prstGeom>
-          <a:ln>
+          <a:ln w="38100">
+            <a:solidFill>
+              <a:srgbClr val="00B0F0"/>
+            </a:solidFill>
             <a:tailEnd type="triangle"/>
           </a:ln>
         </p:spPr>
@@ -4346,7 +4385,10 @@
           <a:prstGeom prst="straightConnector1">
             <a:avLst/>
           </a:prstGeom>
-          <a:ln>
+          <a:ln w="38100">
+            <a:solidFill>
+              <a:srgbClr val="00B0F0"/>
+            </a:solidFill>
             <a:tailEnd type="triangle"/>
           </a:ln>
         </p:spPr>
@@ -4387,7 +4429,10 @@
           <a:prstGeom prst="straightConnector1">
             <a:avLst/>
           </a:prstGeom>
-          <a:ln>
+          <a:ln w="38100">
+            <a:solidFill>
+              <a:srgbClr val="00B0F0"/>
+            </a:solidFill>
             <a:tailEnd type="triangle"/>
           </a:ln>
         </p:spPr>
@@ -4428,7 +4473,10 @@
           <a:prstGeom prst="straightConnector1">
             <a:avLst/>
           </a:prstGeom>
-          <a:ln>
+          <a:ln w="38100">
+            <a:solidFill>
+              <a:srgbClr val="00B0F0"/>
+            </a:solidFill>
             <a:tailEnd type="triangle"/>
           </a:ln>
         </p:spPr>
@@ -4469,7 +4517,10 @@
           <a:prstGeom prst="straightConnector1">
             <a:avLst/>
           </a:prstGeom>
-          <a:ln>
+          <a:ln w="38100">
+            <a:solidFill>
+              <a:srgbClr val="00B0F0"/>
+            </a:solidFill>
             <a:tailEnd type="triangle"/>
           </a:ln>
         </p:spPr>
@@ -4510,7 +4561,10 @@
           <a:prstGeom prst="straightConnector1">
             <a:avLst/>
           </a:prstGeom>
-          <a:ln>
+          <a:ln w="38100">
+            <a:solidFill>
+              <a:srgbClr val="00B0F0"/>
+            </a:solidFill>
             <a:tailEnd type="triangle"/>
           </a:ln>
         </p:spPr>
@@ -4551,7 +4605,10 @@
           <a:prstGeom prst="straightConnector1">
             <a:avLst/>
           </a:prstGeom>
-          <a:ln>
+          <a:ln w="38100">
+            <a:solidFill>
+              <a:srgbClr val="00B0F0"/>
+            </a:solidFill>
             <a:tailEnd type="triangle"/>
           </a:ln>
         </p:spPr>
@@ -4592,7 +4649,10 @@
           <a:prstGeom prst="straightConnector1">
             <a:avLst/>
           </a:prstGeom>
-          <a:ln>
+          <a:ln w="38100">
+            <a:solidFill>
+              <a:srgbClr val="00B0F0"/>
+            </a:solidFill>
             <a:tailEnd type="triangle"/>
           </a:ln>
         </p:spPr>
@@ -4633,7 +4693,10 @@
           <a:prstGeom prst="straightConnector1">
             <a:avLst/>
           </a:prstGeom>
-          <a:ln>
+          <a:ln w="38100">
+            <a:solidFill>
+              <a:srgbClr val="00B0F0"/>
+            </a:solidFill>
             <a:tailEnd type="triangle"/>
           </a:ln>
         </p:spPr>
@@ -4674,7 +4737,10 @@
           <a:prstGeom prst="straightConnector1">
             <a:avLst/>
           </a:prstGeom>
-          <a:ln>
+          <a:ln w="38100">
+            <a:solidFill>
+              <a:srgbClr val="00B0F0"/>
+            </a:solidFill>
             <a:tailEnd type="triangle"/>
           </a:ln>
         </p:spPr>
@@ -4715,7 +4781,10 @@
           <a:prstGeom prst="straightConnector1">
             <a:avLst/>
           </a:prstGeom>
-          <a:ln>
+          <a:ln w="38100">
+            <a:solidFill>
+              <a:srgbClr val="00B0F0"/>
+            </a:solidFill>
             <a:tailEnd type="triangle"/>
           </a:ln>
         </p:spPr>
@@ -4756,7 +4825,10 @@
           <a:prstGeom prst="straightConnector1">
             <a:avLst/>
           </a:prstGeom>
-          <a:ln>
+          <a:ln w="38100">
+            <a:solidFill>
+              <a:srgbClr val="00B0F0"/>
+            </a:solidFill>
             <a:tailEnd type="triangle"/>
           </a:ln>
         </p:spPr>
@@ -4797,7 +4869,10 @@
           <a:prstGeom prst="straightConnector1">
             <a:avLst/>
           </a:prstGeom>
-          <a:ln>
+          <a:ln w="38100">
+            <a:solidFill>
+              <a:srgbClr val="00B0F0"/>
+            </a:solidFill>
             <a:tailEnd type="triangle"/>
           </a:ln>
         </p:spPr>
@@ -4838,7 +4913,10 @@
           <a:prstGeom prst="straightConnector1">
             <a:avLst/>
           </a:prstGeom>
-          <a:ln>
+          <a:ln w="38100">
+            <a:solidFill>
+              <a:srgbClr val="00B0F0"/>
+            </a:solidFill>
             <a:tailEnd type="triangle"/>
           </a:ln>
         </p:spPr>
@@ -4879,7 +4957,10 @@
           <a:prstGeom prst="straightConnector1">
             <a:avLst/>
           </a:prstGeom>
-          <a:ln>
+          <a:ln w="38100">
+            <a:solidFill>
+              <a:srgbClr val="00B0F0"/>
+            </a:solidFill>
             <a:tailEnd type="triangle"/>
           </a:ln>
         </p:spPr>
@@ -4920,7 +5001,10 @@
           <a:prstGeom prst="straightConnector1">
             <a:avLst/>
           </a:prstGeom>
-          <a:ln>
+          <a:ln w="38100">
+            <a:solidFill>
+              <a:srgbClr val="00B0F0"/>
+            </a:solidFill>
             <a:tailEnd type="triangle"/>
           </a:ln>
         </p:spPr>
@@ -4961,7 +5045,10 @@
           <a:prstGeom prst="straightConnector1">
             <a:avLst/>
           </a:prstGeom>
-          <a:ln>
+          <a:ln w="38100">
+            <a:solidFill>
+              <a:srgbClr val="00B0F0"/>
+            </a:solidFill>
             <a:tailEnd type="triangle"/>
           </a:ln>
         </p:spPr>
@@ -5002,7 +5089,10 @@
           <a:prstGeom prst="straightConnector1">
             <a:avLst/>
           </a:prstGeom>
-          <a:ln>
+          <a:ln w="38100">
+            <a:solidFill>
+              <a:srgbClr val="00B0F0"/>
+            </a:solidFill>
             <a:tailEnd type="triangle"/>
           </a:ln>
         </p:spPr>
@@ -5043,7 +5133,10 @@
           <a:prstGeom prst="straightConnector1">
             <a:avLst/>
           </a:prstGeom>
-          <a:ln>
+          <a:ln w="38100">
+            <a:solidFill>
+              <a:srgbClr val="00B0F0"/>
+            </a:solidFill>
             <a:tailEnd type="triangle"/>
           </a:ln>
         </p:spPr>
@@ -5084,7 +5177,10 @@
           <a:prstGeom prst="straightConnector1">
             <a:avLst/>
           </a:prstGeom>
-          <a:ln>
+          <a:ln w="38100">
+            <a:solidFill>
+              <a:srgbClr val="00B0F0"/>
+            </a:solidFill>
             <a:tailEnd type="triangle"/>
           </a:ln>
         </p:spPr>
@@ -5125,7 +5221,10 @@
           <a:prstGeom prst="straightConnector1">
             <a:avLst/>
           </a:prstGeom>
-          <a:ln>
+          <a:ln w="38100">
+            <a:solidFill>
+              <a:srgbClr val="00B0F0"/>
+            </a:solidFill>
             <a:tailEnd type="triangle"/>
           </a:ln>
         </p:spPr>
@@ -5166,7 +5265,10 @@
           <a:prstGeom prst="straightConnector1">
             <a:avLst/>
           </a:prstGeom>
-          <a:ln>
+          <a:ln w="38100">
+            <a:solidFill>
+              <a:srgbClr val="00B0F0"/>
+            </a:solidFill>
             <a:tailEnd type="triangle"/>
           </a:ln>
         </p:spPr>
@@ -5207,7 +5309,10 @@
           <a:prstGeom prst="straightConnector1">
             <a:avLst/>
           </a:prstGeom>
-          <a:ln>
+          <a:ln w="38100">
+            <a:solidFill>
+              <a:srgbClr val="00B0F0"/>
+            </a:solidFill>
             <a:tailEnd type="triangle"/>
           </a:ln>
         </p:spPr>
@@ -5248,7 +5353,10 @@
           <a:prstGeom prst="straightConnector1">
             <a:avLst/>
           </a:prstGeom>
-          <a:ln>
+          <a:ln w="38100">
+            <a:solidFill>
+              <a:srgbClr val="00B0F0"/>
+            </a:solidFill>
             <a:tailEnd type="triangle"/>
           </a:ln>
         </p:spPr>
@@ -5289,7 +5397,10 @@
           <a:prstGeom prst="straightConnector1">
             <a:avLst/>
           </a:prstGeom>
-          <a:ln>
+          <a:ln w="38100">
+            <a:solidFill>
+              <a:srgbClr val="00B0F0"/>
+            </a:solidFill>
             <a:tailEnd type="triangle"/>
           </a:ln>
         </p:spPr>
@@ -5331,7 +5442,11 @@
           <a:solidFill>
             <a:srgbClr val="FFFFFF"/>
           </a:solidFill>
-          <a:ln w="38100"/>
+          <a:ln w="101600">
+            <a:solidFill>
+              <a:srgbClr val="00B0F0"/>
+            </a:solidFill>
+          </a:ln>
         </p:spPr>
         <p:style>
           <a:lnRef idx="2">
@@ -5380,7 +5495,10 @@
           <a:prstGeom prst="straightConnector1">
             <a:avLst/>
           </a:prstGeom>
-          <a:ln>
+          <a:ln w="38100">
+            <a:solidFill>
+              <a:srgbClr val="00B0F0"/>
+            </a:solidFill>
             <a:tailEnd type="triangle"/>
           </a:ln>
         </p:spPr>
@@ -5421,7 +5539,10 @@
           <a:prstGeom prst="straightConnector1">
             <a:avLst/>
           </a:prstGeom>
-          <a:ln>
+          <a:ln w="38100">
+            <a:solidFill>
+              <a:srgbClr val="00B0F0"/>
+            </a:solidFill>
             <a:tailEnd type="triangle"/>
           </a:ln>
         </p:spPr>
@@ -5463,7 +5584,11 @@
           <a:solidFill>
             <a:srgbClr val="FFFFFF"/>
           </a:solidFill>
-          <a:ln w="38100"/>
+          <a:ln w="101600">
+            <a:solidFill>
+              <a:srgbClr val="00B0F0"/>
+            </a:solidFill>
+          </a:ln>
         </p:spPr>
         <p:style>
           <a:lnRef idx="2">

</xml_diff>

<commit_message>
changed urls on projects to link to publication sites, pdf versions still available under /publications/
</commit_message>
<xml_diff>
--- a/images/src/cliparts.pptx
+++ b/images/src/cliparts.pptx
@@ -7,7 +7,8 @@
   <p:sldIdLst>
     <p:sldId id="256" r:id="rId2"/>
     <p:sldId id="257" r:id="rId3"/>
-    <p:sldId id="258" r:id="rId4"/>
+    <p:sldId id="259" r:id="rId4"/>
+    <p:sldId id="258" r:id="rId5"/>
   </p:sldIdLst>
   <p:sldSz cx="12192000" cy="6858000"/>
   <p:notesSz cx="6858000" cy="9144000"/>
@@ -261,7 +262,7 @@
           <a:p>
             <a:fld id="{030E8E6B-5E7B-4B7B-BC20-E6C56F6F42C4}" type="datetimeFigureOut">
               <a:rPr lang="en-GB" smtClean="0"/>
-              <a:t>31/10/2023</a:t>
+              <a:t>18/02/2024</a:t>
             </a:fld>
             <a:endParaRPr lang="en-GB"/>
           </a:p>
@@ -459,7 +460,7 @@
           <a:p>
             <a:fld id="{030E8E6B-5E7B-4B7B-BC20-E6C56F6F42C4}" type="datetimeFigureOut">
               <a:rPr lang="en-GB" smtClean="0"/>
-              <a:t>31/10/2023</a:t>
+              <a:t>18/02/2024</a:t>
             </a:fld>
             <a:endParaRPr lang="en-GB"/>
           </a:p>
@@ -667,7 +668,7 @@
           <a:p>
             <a:fld id="{030E8E6B-5E7B-4B7B-BC20-E6C56F6F42C4}" type="datetimeFigureOut">
               <a:rPr lang="en-GB" smtClean="0"/>
-              <a:t>31/10/2023</a:t>
+              <a:t>18/02/2024</a:t>
             </a:fld>
             <a:endParaRPr lang="en-GB"/>
           </a:p>
@@ -865,7 +866,7 @@
           <a:p>
             <a:fld id="{030E8E6B-5E7B-4B7B-BC20-E6C56F6F42C4}" type="datetimeFigureOut">
               <a:rPr lang="en-GB" smtClean="0"/>
-              <a:t>31/10/2023</a:t>
+              <a:t>18/02/2024</a:t>
             </a:fld>
             <a:endParaRPr lang="en-GB"/>
           </a:p>
@@ -1140,7 +1141,7 @@
           <a:p>
             <a:fld id="{030E8E6B-5E7B-4B7B-BC20-E6C56F6F42C4}" type="datetimeFigureOut">
               <a:rPr lang="en-GB" smtClean="0"/>
-              <a:t>31/10/2023</a:t>
+              <a:t>18/02/2024</a:t>
             </a:fld>
             <a:endParaRPr lang="en-GB"/>
           </a:p>
@@ -1405,7 +1406,7 @@
           <a:p>
             <a:fld id="{030E8E6B-5E7B-4B7B-BC20-E6C56F6F42C4}" type="datetimeFigureOut">
               <a:rPr lang="en-GB" smtClean="0"/>
-              <a:t>31/10/2023</a:t>
+              <a:t>18/02/2024</a:t>
             </a:fld>
             <a:endParaRPr lang="en-GB"/>
           </a:p>
@@ -1817,7 +1818,7 @@
           <a:p>
             <a:fld id="{030E8E6B-5E7B-4B7B-BC20-E6C56F6F42C4}" type="datetimeFigureOut">
               <a:rPr lang="en-GB" smtClean="0"/>
-              <a:t>31/10/2023</a:t>
+              <a:t>18/02/2024</a:t>
             </a:fld>
             <a:endParaRPr lang="en-GB"/>
           </a:p>
@@ -1958,7 +1959,7 @@
           <a:p>
             <a:fld id="{030E8E6B-5E7B-4B7B-BC20-E6C56F6F42C4}" type="datetimeFigureOut">
               <a:rPr lang="en-GB" smtClean="0"/>
-              <a:t>31/10/2023</a:t>
+              <a:t>18/02/2024</a:t>
             </a:fld>
             <a:endParaRPr lang="en-GB"/>
           </a:p>
@@ -2071,7 +2072,7 @@
           <a:p>
             <a:fld id="{030E8E6B-5E7B-4B7B-BC20-E6C56F6F42C4}" type="datetimeFigureOut">
               <a:rPr lang="en-GB" smtClean="0"/>
-              <a:t>31/10/2023</a:t>
+              <a:t>18/02/2024</a:t>
             </a:fld>
             <a:endParaRPr lang="en-GB"/>
           </a:p>
@@ -2382,7 +2383,7 @@
           <a:p>
             <a:fld id="{030E8E6B-5E7B-4B7B-BC20-E6C56F6F42C4}" type="datetimeFigureOut">
               <a:rPr lang="en-GB" smtClean="0"/>
-              <a:t>31/10/2023</a:t>
+              <a:t>18/02/2024</a:t>
             </a:fld>
             <a:endParaRPr lang="en-GB"/>
           </a:p>
@@ -2670,7 +2671,7 @@
           <a:p>
             <a:fld id="{030E8E6B-5E7B-4B7B-BC20-E6C56F6F42C4}" type="datetimeFigureOut">
               <a:rPr lang="en-GB" smtClean="0"/>
-              <a:t>31/10/2023</a:t>
+              <a:t>18/02/2024</a:t>
             </a:fld>
             <a:endParaRPr lang="en-GB"/>
           </a:p>
@@ -2911,7 +2912,7 @@
           <a:p>
             <a:fld id="{030E8E6B-5E7B-4B7B-BC20-E6C56F6F42C4}" type="datetimeFigureOut">
               <a:rPr lang="en-GB" smtClean="0"/>
-              <a:t>31/10/2023</a:t>
+              <a:t>18/02/2024</a:t>
             </a:fld>
             <a:endParaRPr lang="en-GB"/>
           </a:p>
@@ -3847,7 +3848,7 @@
         </p:nvSpPr>
         <p:spPr>
           <a:xfrm>
-            <a:off x="2183594" y="1500244"/>
+            <a:off x="3608982" y="1428527"/>
             <a:ext cx="815788" cy="815788"/>
           </a:xfrm>
           <a:prstGeom prst="ellipse">
@@ -3858,7 +3859,10 @@
           </a:solidFill>
           <a:ln w="101600">
             <a:solidFill>
-              <a:srgbClr val="00B0F0"/>
+              <a:schemeClr val="tx1">
+                <a:lumMod val="95000"/>
+                <a:lumOff val="5000"/>
+              </a:schemeClr>
             </a:solidFill>
           </a:ln>
         </p:spPr>
@@ -3901,7 +3905,7 @@
         </p:nvSpPr>
         <p:spPr>
           <a:xfrm>
-            <a:off x="2183594" y="2598420"/>
+            <a:off x="3608982" y="2526703"/>
             <a:ext cx="815788" cy="815788"/>
           </a:xfrm>
           <a:prstGeom prst="ellipse">
@@ -3912,7 +3916,10 @@
           </a:solidFill>
           <a:ln w="101600">
             <a:solidFill>
-              <a:srgbClr val="00B0F0"/>
+              <a:schemeClr val="tx1">
+                <a:lumMod val="95000"/>
+                <a:lumOff val="5000"/>
+              </a:schemeClr>
             </a:solidFill>
           </a:ln>
         </p:spPr>
@@ -3955,7 +3962,7 @@
         </p:nvSpPr>
         <p:spPr>
           <a:xfrm>
-            <a:off x="2183594" y="3696596"/>
+            <a:off x="3608982" y="3624879"/>
             <a:ext cx="815788" cy="815788"/>
           </a:xfrm>
           <a:prstGeom prst="ellipse">
@@ -3966,7 +3973,10 @@
           </a:solidFill>
           <a:ln w="101600">
             <a:solidFill>
-              <a:srgbClr val="00B0F0"/>
+              <a:schemeClr val="tx1">
+                <a:lumMod val="95000"/>
+                <a:lumOff val="5000"/>
+              </a:schemeClr>
             </a:solidFill>
           </a:ln>
         </p:spPr>
@@ -4009,7 +4019,7 @@
         </p:nvSpPr>
         <p:spPr>
           <a:xfrm>
-            <a:off x="3860788" y="3187586"/>
+            <a:off x="5286176" y="3115869"/>
             <a:ext cx="815788" cy="815788"/>
           </a:xfrm>
           <a:prstGeom prst="ellipse">
@@ -4020,7 +4030,10 @@
           </a:solidFill>
           <a:ln w="101600">
             <a:solidFill>
-              <a:srgbClr val="00B0F0"/>
+              <a:schemeClr val="tx1">
+                <a:lumMod val="95000"/>
+                <a:lumOff val="5000"/>
+              </a:schemeClr>
             </a:solidFill>
           </a:ln>
         </p:spPr>
@@ -4063,7 +4076,7 @@
         </p:nvSpPr>
         <p:spPr>
           <a:xfrm>
-            <a:off x="3833099" y="2082950"/>
+            <a:off x="5258487" y="2011233"/>
             <a:ext cx="815788" cy="815788"/>
           </a:xfrm>
           <a:prstGeom prst="ellipse">
@@ -4074,7 +4087,10 @@
           </a:solidFill>
           <a:ln w="101600">
             <a:solidFill>
-              <a:srgbClr val="00B0F0"/>
+              <a:schemeClr val="tx1">
+                <a:lumMod val="95000"/>
+                <a:lumOff val="5000"/>
+              </a:schemeClr>
             </a:solidFill>
           </a:ln>
         </p:spPr>
@@ -4117,7 +4133,7 @@
         </p:nvSpPr>
         <p:spPr>
           <a:xfrm>
-            <a:off x="3854822" y="883025"/>
+            <a:off x="5280210" y="811308"/>
             <a:ext cx="815788" cy="815788"/>
           </a:xfrm>
           <a:prstGeom prst="ellipse">
@@ -4128,7 +4144,10 @@
           </a:solidFill>
           <a:ln w="101600">
             <a:solidFill>
-              <a:srgbClr val="00B0F0"/>
+              <a:schemeClr val="tx1">
+                <a:lumMod val="95000"/>
+                <a:lumOff val="5000"/>
+              </a:schemeClr>
             </a:solidFill>
           </a:ln>
         </p:spPr>
@@ -4171,7 +4190,7 @@
         </p:nvSpPr>
         <p:spPr>
           <a:xfrm>
-            <a:off x="5504327" y="1515036"/>
+            <a:off x="6929715" y="1443319"/>
             <a:ext cx="815788" cy="815788"/>
           </a:xfrm>
           <a:prstGeom prst="ellipse">
@@ -4182,7 +4201,10 @@
           </a:solidFill>
           <a:ln w="101600">
             <a:solidFill>
-              <a:srgbClr val="00B0F0"/>
+              <a:schemeClr val="tx1">
+                <a:lumMod val="95000"/>
+                <a:lumOff val="5000"/>
+              </a:schemeClr>
             </a:solidFill>
           </a:ln>
         </p:spPr>
@@ -4225,7 +4247,7 @@
         </p:nvSpPr>
         <p:spPr>
           <a:xfrm>
-            <a:off x="5504327" y="2613212"/>
+            <a:off x="6929715" y="2541495"/>
             <a:ext cx="815788" cy="815788"/>
           </a:xfrm>
           <a:prstGeom prst="ellipse">
@@ -4236,7 +4258,10 @@
           </a:solidFill>
           <a:ln w="101600">
             <a:solidFill>
-              <a:srgbClr val="00B0F0"/>
+              <a:schemeClr val="tx1">
+                <a:lumMod val="95000"/>
+                <a:lumOff val="5000"/>
+              </a:schemeClr>
             </a:solidFill>
           </a:ln>
         </p:spPr>
@@ -4279,7 +4304,7 @@
         </p:nvSpPr>
         <p:spPr>
           <a:xfrm>
-            <a:off x="5504327" y="3711388"/>
+            <a:off x="6929715" y="3639671"/>
             <a:ext cx="815788" cy="815788"/>
           </a:xfrm>
           <a:prstGeom prst="ellipse">
@@ -4290,7 +4315,10 @@
           </a:solidFill>
           <a:ln w="101600">
             <a:solidFill>
-              <a:srgbClr val="00B0F0"/>
+              <a:schemeClr val="tx1">
+                <a:lumMod val="95000"/>
+                <a:lumOff val="5000"/>
+              </a:schemeClr>
             </a:solidFill>
           </a:ln>
         </p:spPr>
@@ -4335,7 +4363,7 @@
         </p:nvCxnSpPr>
         <p:spPr>
           <a:xfrm>
-            <a:off x="3077806" y="1922929"/>
+            <a:off x="4503194" y="1851212"/>
             <a:ext cx="720315" cy="582707"/>
           </a:xfrm>
           <a:prstGeom prst="straightConnector1">
@@ -4343,7 +4371,10 @@
           </a:prstGeom>
           <a:ln w="38100">
             <a:solidFill>
-              <a:srgbClr val="00B0F0"/>
+              <a:schemeClr val="tx1">
+                <a:lumMod val="95000"/>
+                <a:lumOff val="5000"/>
+              </a:schemeClr>
             </a:solidFill>
             <a:tailEnd type="triangle"/>
           </a:ln>
@@ -4379,7 +4410,7 @@
         </p:nvCxnSpPr>
         <p:spPr>
           <a:xfrm flipV="1">
-            <a:off x="3077806" y="1290919"/>
+            <a:off x="4503194" y="1219202"/>
             <a:ext cx="720315" cy="632011"/>
           </a:xfrm>
           <a:prstGeom prst="straightConnector1">
@@ -4387,7 +4418,10 @@
           </a:prstGeom>
           <a:ln w="38100">
             <a:solidFill>
-              <a:srgbClr val="00B0F0"/>
+              <a:schemeClr val="tx1">
+                <a:lumMod val="95000"/>
+                <a:lumOff val="5000"/>
+              </a:schemeClr>
             </a:solidFill>
             <a:tailEnd type="triangle"/>
           </a:ln>
@@ -4423,7 +4457,7 @@
         </p:nvCxnSpPr>
         <p:spPr>
           <a:xfrm>
-            <a:off x="3077806" y="1922928"/>
+            <a:off x="4503194" y="1851211"/>
             <a:ext cx="720315" cy="1635612"/>
           </a:xfrm>
           <a:prstGeom prst="straightConnector1">
@@ -4431,7 +4465,10 @@
           </a:prstGeom>
           <a:ln w="38100">
             <a:solidFill>
-              <a:srgbClr val="00B0F0"/>
+              <a:schemeClr val="tx1">
+                <a:lumMod val="95000"/>
+                <a:lumOff val="5000"/>
+              </a:schemeClr>
             </a:solidFill>
             <a:tailEnd type="triangle"/>
           </a:ln>
@@ -4467,7 +4504,7 @@
         </p:nvCxnSpPr>
         <p:spPr>
           <a:xfrm>
-            <a:off x="3077805" y="1926517"/>
+            <a:off x="4503193" y="1854800"/>
             <a:ext cx="724814" cy="2772483"/>
           </a:xfrm>
           <a:prstGeom prst="straightConnector1">
@@ -4475,7 +4512,10 @@
           </a:prstGeom>
           <a:ln w="38100">
             <a:solidFill>
-              <a:srgbClr val="00B0F0"/>
+              <a:schemeClr val="tx1">
+                <a:lumMod val="95000"/>
+                <a:lumOff val="5000"/>
+              </a:schemeClr>
             </a:solidFill>
             <a:tailEnd type="triangle"/>
           </a:ln>
@@ -4511,7 +4551,7 @@
         </p:nvCxnSpPr>
         <p:spPr>
           <a:xfrm>
-            <a:off x="3077805" y="3021106"/>
+            <a:off x="4503193" y="2949389"/>
             <a:ext cx="720316" cy="1801458"/>
           </a:xfrm>
           <a:prstGeom prst="straightConnector1">
@@ -4519,7 +4559,10 @@
           </a:prstGeom>
           <a:ln w="38100">
             <a:solidFill>
-              <a:srgbClr val="00B0F0"/>
+              <a:schemeClr val="tx1">
+                <a:lumMod val="95000"/>
+                <a:lumOff val="5000"/>
+              </a:schemeClr>
             </a:solidFill>
             <a:tailEnd type="triangle"/>
           </a:ln>
@@ -4555,7 +4598,7 @@
         </p:nvCxnSpPr>
         <p:spPr>
           <a:xfrm flipV="1">
-            <a:off x="3088449" y="2505636"/>
+            <a:off x="4513837" y="2433919"/>
             <a:ext cx="709672" cy="496646"/>
           </a:xfrm>
           <a:prstGeom prst="straightConnector1">
@@ -4563,7 +4606,10 @@
           </a:prstGeom>
           <a:ln w="38100">
             <a:solidFill>
-              <a:srgbClr val="00B0F0"/>
+              <a:schemeClr val="tx1">
+                <a:lumMod val="95000"/>
+                <a:lumOff val="5000"/>
+              </a:schemeClr>
             </a:solidFill>
             <a:tailEnd type="triangle"/>
           </a:ln>
@@ -4599,7 +4645,7 @@
         </p:nvCxnSpPr>
         <p:spPr>
           <a:xfrm>
-            <a:off x="3086318" y="3017519"/>
+            <a:off x="4511706" y="2945802"/>
             <a:ext cx="711803" cy="582706"/>
           </a:xfrm>
           <a:prstGeom prst="straightConnector1">
@@ -4607,7 +4653,10 @@
           </a:prstGeom>
           <a:ln w="38100">
             <a:solidFill>
-              <a:srgbClr val="00B0F0"/>
+              <a:schemeClr val="tx1">
+                <a:lumMod val="95000"/>
+                <a:lumOff val="5000"/>
+              </a:schemeClr>
             </a:solidFill>
             <a:tailEnd type="triangle"/>
           </a:ln>
@@ -4643,7 +4692,7 @@
         </p:nvCxnSpPr>
         <p:spPr>
           <a:xfrm flipV="1">
-            <a:off x="3077804" y="1336076"/>
+            <a:off x="4503192" y="1264359"/>
             <a:ext cx="720317" cy="1676514"/>
           </a:xfrm>
           <a:prstGeom prst="straightConnector1">
@@ -4651,7 +4700,10 @@
           </a:prstGeom>
           <a:ln w="38100">
             <a:solidFill>
-              <a:srgbClr val="00B0F0"/>
+              <a:schemeClr val="tx1">
+                <a:lumMod val="95000"/>
+                <a:lumOff val="5000"/>
+              </a:schemeClr>
             </a:solidFill>
             <a:tailEnd type="triangle"/>
           </a:ln>
@@ -4687,7 +4739,7 @@
         </p:nvCxnSpPr>
         <p:spPr>
           <a:xfrm>
-            <a:off x="3086318" y="4119282"/>
+            <a:off x="4511706" y="4047565"/>
             <a:ext cx="711803" cy="815788"/>
           </a:xfrm>
           <a:prstGeom prst="straightConnector1">
@@ -4695,7 +4747,10 @@
           </a:prstGeom>
           <a:ln w="38100">
             <a:solidFill>
-              <a:srgbClr val="00B0F0"/>
+              <a:schemeClr val="tx1">
+                <a:lumMod val="95000"/>
+                <a:lumOff val="5000"/>
+              </a:schemeClr>
             </a:solidFill>
             <a:tailEnd type="triangle"/>
           </a:ln>
@@ -4731,7 +4786,7 @@
         </p:nvCxnSpPr>
         <p:spPr>
           <a:xfrm flipV="1">
-            <a:off x="3086316" y="3608741"/>
+            <a:off x="4511704" y="3537024"/>
             <a:ext cx="711805" cy="510541"/>
           </a:xfrm>
           <a:prstGeom prst="straightConnector1">
@@ -4739,7 +4794,10 @@
           </a:prstGeom>
           <a:ln w="38100">
             <a:solidFill>
-              <a:srgbClr val="00B0F0"/>
+              <a:schemeClr val="tx1">
+                <a:lumMod val="95000"/>
+                <a:lumOff val="5000"/>
+              </a:schemeClr>
             </a:solidFill>
             <a:tailEnd type="triangle"/>
           </a:ln>
@@ -4775,7 +4833,7 @@
         </p:nvCxnSpPr>
         <p:spPr>
           <a:xfrm flipV="1">
-            <a:off x="3104580" y="2548107"/>
+            <a:off x="4529968" y="2476390"/>
             <a:ext cx="693541" cy="1589552"/>
           </a:xfrm>
           <a:prstGeom prst="straightConnector1">
@@ -4783,7 +4841,10 @@
           </a:prstGeom>
           <a:ln w="38100">
             <a:solidFill>
-              <a:srgbClr val="00B0F0"/>
+              <a:schemeClr val="tx1">
+                <a:lumMod val="95000"/>
+                <a:lumOff val="5000"/>
+              </a:schemeClr>
             </a:solidFill>
             <a:tailEnd type="triangle"/>
           </a:ln>
@@ -4819,7 +4880,7 @@
         </p:nvCxnSpPr>
         <p:spPr>
           <a:xfrm flipV="1">
-            <a:off x="3093150" y="1431271"/>
+            <a:off x="4518538" y="1359554"/>
             <a:ext cx="713482" cy="2698098"/>
           </a:xfrm>
           <a:prstGeom prst="straightConnector1">
@@ -4827,7 +4888,10 @@
           </a:prstGeom>
           <a:ln w="38100">
             <a:solidFill>
-              <a:srgbClr val="00B0F0"/>
+              <a:schemeClr val="tx1">
+                <a:lumMod val="95000"/>
+                <a:lumOff val="5000"/>
+              </a:schemeClr>
             </a:solidFill>
             <a:tailEnd type="triangle"/>
           </a:ln>
@@ -4863,7 +4927,7 @@
         </p:nvCxnSpPr>
         <p:spPr>
           <a:xfrm flipV="1">
-            <a:off x="4727309" y="3002282"/>
+            <a:off x="6152697" y="2930565"/>
             <a:ext cx="720319" cy="727035"/>
           </a:xfrm>
           <a:prstGeom prst="straightConnector1">
@@ -4871,7 +4935,10 @@
           </a:prstGeom>
           <a:ln w="38100">
             <a:solidFill>
-              <a:srgbClr val="00B0F0"/>
+              <a:schemeClr val="tx1">
+                <a:lumMod val="95000"/>
+                <a:lumOff val="5000"/>
+              </a:schemeClr>
             </a:solidFill>
             <a:tailEnd type="triangle"/>
           </a:ln>
@@ -4907,7 +4974,7 @@
         </p:nvCxnSpPr>
         <p:spPr>
           <a:xfrm>
-            <a:off x="4717333" y="3720353"/>
+            <a:off x="6142721" y="3648636"/>
             <a:ext cx="730295" cy="398929"/>
           </a:xfrm>
           <a:prstGeom prst="straightConnector1">
@@ -4915,7 +4982,10 @@
           </a:prstGeom>
           <a:ln w="38100">
             <a:solidFill>
-              <a:srgbClr val="00B0F0"/>
+              <a:schemeClr val="tx1">
+                <a:lumMod val="95000"/>
+                <a:lumOff val="5000"/>
+              </a:schemeClr>
             </a:solidFill>
             <a:tailEnd type="triangle"/>
           </a:ln>
@@ -4951,7 +5021,7 @@
         </p:nvCxnSpPr>
         <p:spPr>
           <a:xfrm flipV="1">
-            <a:off x="4717333" y="2035464"/>
+            <a:off x="6142721" y="1963747"/>
             <a:ext cx="670007" cy="1693853"/>
           </a:xfrm>
           <a:prstGeom prst="straightConnector1">
@@ -4959,7 +5029,10 @@
           </a:prstGeom>
           <a:ln w="38100">
             <a:solidFill>
-              <a:srgbClr val="00B0F0"/>
+              <a:schemeClr val="tx1">
+                <a:lumMod val="95000"/>
+                <a:lumOff val="5000"/>
+              </a:schemeClr>
             </a:solidFill>
             <a:tailEnd type="triangle"/>
           </a:ln>
@@ -4995,7 +5068,7 @@
         </p:nvCxnSpPr>
         <p:spPr>
           <a:xfrm flipV="1">
-            <a:off x="4727309" y="4119282"/>
+            <a:off x="6152697" y="4047565"/>
             <a:ext cx="720319" cy="815788"/>
           </a:xfrm>
           <a:prstGeom prst="straightConnector1">
@@ -5003,7 +5076,10 @@
           </a:prstGeom>
           <a:ln w="38100">
             <a:solidFill>
-              <a:srgbClr val="00B0F0"/>
+              <a:schemeClr val="tx1">
+                <a:lumMod val="95000"/>
+                <a:lumOff val="5000"/>
+              </a:schemeClr>
             </a:solidFill>
             <a:tailEnd type="triangle"/>
           </a:ln>
@@ -5039,7 +5115,7 @@
         </p:nvCxnSpPr>
         <p:spPr>
           <a:xfrm flipV="1">
-            <a:off x="4727309" y="3093720"/>
+            <a:off x="6152697" y="3022003"/>
             <a:ext cx="720319" cy="1841350"/>
           </a:xfrm>
           <a:prstGeom prst="straightConnector1">
@@ -5047,7 +5123,10 @@
           </a:prstGeom>
           <a:ln w="38100">
             <a:solidFill>
-              <a:srgbClr val="00B0F0"/>
+              <a:schemeClr val="tx1">
+                <a:lumMod val="95000"/>
+                <a:lumOff val="5000"/>
+              </a:schemeClr>
             </a:solidFill>
             <a:tailEnd type="triangle"/>
           </a:ln>
@@ -5083,7 +5162,7 @@
         </p:nvCxnSpPr>
         <p:spPr>
           <a:xfrm flipV="1">
-            <a:off x="4717333" y="2050256"/>
+            <a:off x="6142721" y="1978539"/>
             <a:ext cx="747636" cy="2870022"/>
           </a:xfrm>
           <a:prstGeom prst="straightConnector1">
@@ -5091,7 +5170,10 @@
           </a:prstGeom>
           <a:ln w="38100">
             <a:solidFill>
-              <a:srgbClr val="00B0F0"/>
+              <a:schemeClr val="tx1">
+                <a:lumMod val="95000"/>
+                <a:lumOff val="5000"/>
+              </a:schemeClr>
             </a:solidFill>
             <a:tailEnd type="triangle"/>
           </a:ln>
@@ -5127,7 +5209,7 @@
         </p:nvCxnSpPr>
         <p:spPr>
           <a:xfrm>
-            <a:off x="4727309" y="1290919"/>
+            <a:off x="6152697" y="1219202"/>
             <a:ext cx="720319" cy="632009"/>
           </a:xfrm>
           <a:prstGeom prst="straightConnector1">
@@ -5135,7 +5217,10 @@
           </a:prstGeom>
           <a:ln w="38100">
             <a:solidFill>
-              <a:srgbClr val="00B0F0"/>
+              <a:schemeClr val="tx1">
+                <a:lumMod val="95000"/>
+                <a:lumOff val="5000"/>
+              </a:schemeClr>
             </a:solidFill>
             <a:tailEnd type="triangle"/>
           </a:ln>
@@ -5171,7 +5256,7 @@
         </p:nvCxnSpPr>
         <p:spPr>
           <a:xfrm>
-            <a:off x="4717333" y="1296688"/>
+            <a:off x="6142721" y="1224971"/>
             <a:ext cx="730295" cy="1616842"/>
           </a:xfrm>
           <a:prstGeom prst="straightConnector1">
@@ -5179,7 +5264,10 @@
           </a:prstGeom>
           <a:ln w="38100">
             <a:solidFill>
-              <a:srgbClr val="00B0F0"/>
+              <a:schemeClr val="tx1">
+                <a:lumMod val="95000"/>
+                <a:lumOff val="5000"/>
+              </a:schemeClr>
             </a:solidFill>
             <a:tailEnd type="triangle"/>
           </a:ln>
@@ -5215,7 +5303,7 @@
         </p:nvCxnSpPr>
         <p:spPr>
           <a:xfrm>
-            <a:off x="4717333" y="1277653"/>
+            <a:off x="6142721" y="1205936"/>
             <a:ext cx="730295" cy="2736742"/>
           </a:xfrm>
           <a:prstGeom prst="straightConnector1">
@@ -5223,7 +5311,10 @@
           </a:prstGeom>
           <a:ln w="38100">
             <a:solidFill>
-              <a:srgbClr val="00B0F0"/>
+              <a:schemeClr val="tx1">
+                <a:lumMod val="95000"/>
+                <a:lumOff val="5000"/>
+              </a:schemeClr>
             </a:solidFill>
             <a:tailEnd type="triangle"/>
           </a:ln>
@@ -5259,7 +5350,7 @@
         </p:nvCxnSpPr>
         <p:spPr>
           <a:xfrm flipV="1">
-            <a:off x="4708822" y="1965960"/>
+            <a:off x="6134210" y="1894243"/>
             <a:ext cx="708998" cy="539676"/>
           </a:xfrm>
           <a:prstGeom prst="straightConnector1">
@@ -5267,7 +5358,10 @@
           </a:prstGeom>
           <a:ln w="38100">
             <a:solidFill>
-              <a:srgbClr val="00B0F0"/>
+              <a:schemeClr val="tx1">
+                <a:lumMod val="95000"/>
+                <a:lumOff val="5000"/>
+              </a:schemeClr>
             </a:solidFill>
             <a:tailEnd type="triangle"/>
           </a:ln>
@@ -5303,7 +5397,7 @@
         </p:nvCxnSpPr>
         <p:spPr>
           <a:xfrm>
-            <a:off x="4717333" y="2505636"/>
+            <a:off x="6142721" y="2433919"/>
             <a:ext cx="730295" cy="464898"/>
           </a:xfrm>
           <a:prstGeom prst="straightConnector1">
@@ -5311,7 +5405,10 @@
           </a:prstGeom>
           <a:ln w="38100">
             <a:solidFill>
-              <a:srgbClr val="00B0F0"/>
+              <a:schemeClr val="tx1">
+                <a:lumMod val="95000"/>
+                <a:lumOff val="5000"/>
+              </a:schemeClr>
             </a:solidFill>
             <a:tailEnd type="triangle"/>
           </a:ln>
@@ -5347,7 +5444,7 @@
         </p:nvCxnSpPr>
         <p:spPr>
           <a:xfrm>
-            <a:off x="4717333" y="2505636"/>
+            <a:off x="6142721" y="2433919"/>
             <a:ext cx="700487" cy="1540507"/>
           </a:xfrm>
           <a:prstGeom prst="straightConnector1">
@@ -5355,7 +5452,10 @@
           </a:prstGeom>
           <a:ln w="38100">
             <a:solidFill>
-              <a:srgbClr val="00B0F0"/>
+              <a:schemeClr val="tx1">
+                <a:lumMod val="95000"/>
+                <a:lumOff val="5000"/>
+              </a:schemeClr>
             </a:solidFill>
             <a:tailEnd type="triangle"/>
           </a:ln>
@@ -5391,7 +5491,7 @@
         </p:nvCxnSpPr>
         <p:spPr>
           <a:xfrm>
-            <a:off x="6376814" y="1918894"/>
+            <a:off x="7802202" y="1847177"/>
             <a:ext cx="930766" cy="1051640"/>
           </a:xfrm>
           <a:prstGeom prst="straightConnector1">
@@ -5399,7 +5499,10 @@
           </a:prstGeom>
           <a:ln w="38100">
             <a:solidFill>
-              <a:srgbClr val="00B0F0"/>
+              <a:schemeClr val="tx1">
+                <a:lumMod val="95000"/>
+                <a:lumOff val="5000"/>
+              </a:schemeClr>
             </a:solidFill>
             <a:tailEnd type="triangle"/>
           </a:ln>
@@ -5433,7 +5536,7 @@
         </p:nvSpPr>
         <p:spPr>
           <a:xfrm>
-            <a:off x="7363135" y="2613212"/>
+            <a:off x="8788523" y="2541495"/>
             <a:ext cx="815788" cy="815788"/>
           </a:xfrm>
           <a:prstGeom prst="ellipse">
@@ -5444,7 +5547,10 @@
           </a:solidFill>
           <a:ln w="101600">
             <a:solidFill>
-              <a:srgbClr val="00B0F0"/>
+              <a:schemeClr val="tx1">
+                <a:lumMod val="95000"/>
+                <a:lumOff val="5000"/>
+              </a:schemeClr>
             </a:solidFill>
           </a:ln>
         </p:spPr>
@@ -5489,7 +5595,7 @@
         </p:nvCxnSpPr>
         <p:spPr>
           <a:xfrm>
-            <a:off x="6375670" y="3021106"/>
+            <a:off x="7801058" y="2949389"/>
             <a:ext cx="931910" cy="0"/>
           </a:xfrm>
           <a:prstGeom prst="straightConnector1">
@@ -5497,7 +5603,10 @@
           </a:prstGeom>
           <a:ln w="38100">
             <a:solidFill>
-              <a:srgbClr val="00B0F0"/>
+              <a:schemeClr val="tx1">
+                <a:lumMod val="95000"/>
+                <a:lumOff val="5000"/>
+              </a:schemeClr>
             </a:solidFill>
             <a:tailEnd type="triangle"/>
           </a:ln>
@@ -5533,7 +5642,7 @@
         </p:nvCxnSpPr>
         <p:spPr>
           <a:xfrm flipV="1">
-            <a:off x="6376814" y="3071679"/>
+            <a:off x="7802202" y="2999962"/>
             <a:ext cx="930766" cy="1047603"/>
           </a:xfrm>
           <a:prstGeom prst="straightConnector1">
@@ -5541,7 +5650,10 @@
           </a:prstGeom>
           <a:ln w="38100">
             <a:solidFill>
-              <a:srgbClr val="00B0F0"/>
+              <a:schemeClr val="tx1">
+                <a:lumMod val="95000"/>
+                <a:lumOff val="5000"/>
+              </a:schemeClr>
             </a:solidFill>
             <a:tailEnd type="triangle"/>
           </a:ln>
@@ -5575,7 +5687,7 @@
         </p:nvSpPr>
         <p:spPr>
           <a:xfrm>
-            <a:off x="3862187" y="4387511"/>
+            <a:off x="5287575" y="4315794"/>
             <a:ext cx="815788" cy="815788"/>
           </a:xfrm>
           <a:prstGeom prst="ellipse">
@@ -5586,7 +5698,10 @@
           </a:solidFill>
           <a:ln w="101600">
             <a:solidFill>
-              <a:srgbClr val="00B0F0"/>
+              <a:schemeClr val="tx1">
+                <a:lumMod val="95000"/>
+                <a:lumOff val="5000"/>
+              </a:schemeClr>
             </a:solidFill>
           </a:ln>
         </p:spPr>
@@ -5629,6 +5744,2750 @@
 </file>
 
 <file path=ppt/slides/slide3.xml><?xml version="1.0" encoding="utf-8"?>
+<p:sld xmlns:a="http://schemas.openxmlformats.org/drawingml/2006/main" xmlns:r="http://schemas.openxmlformats.org/officeDocument/2006/relationships" xmlns:p="http://schemas.openxmlformats.org/presentationml/2006/main">
+  <p:cSld>
+    <p:spTree>
+      <p:nvGrpSpPr>
+        <p:cNvPr id="1" name=""/>
+        <p:cNvGrpSpPr/>
+        <p:nvPr/>
+      </p:nvGrpSpPr>
+      <p:grpSpPr>
+        <a:xfrm>
+          <a:off x="0" y="0"/>
+          <a:ext cx="0" cy="0"/>
+          <a:chOff x="0" y="0"/>
+          <a:chExt cx="0" cy="0"/>
+        </a:xfrm>
+      </p:grpSpPr>
+      <p:sp>
+        <p:nvSpPr>
+          <p:cNvPr id="4" name="Oval 3">
+            <a:extLst>
+              <a:ext uri="{FF2B5EF4-FFF2-40B4-BE49-F238E27FC236}">
+                <a16:creationId xmlns:a16="http://schemas.microsoft.com/office/drawing/2014/main" id="{54C7394A-B451-7B0B-E65E-91B2C76546ED}"/>
+              </a:ext>
+            </a:extLst>
+          </p:cNvPr>
+          <p:cNvSpPr/>
+          <p:nvPr/>
+        </p:nvSpPr>
+        <p:spPr>
+          <a:xfrm>
+            <a:off x="3608982" y="1428527"/>
+            <a:ext cx="815788" cy="815788"/>
+          </a:xfrm>
+          <a:prstGeom prst="ellipse">
+            <a:avLst/>
+          </a:prstGeom>
+          <a:solidFill>
+            <a:srgbClr val="FFFFFF"/>
+          </a:solidFill>
+          <a:ln w="31750">
+            <a:solidFill>
+              <a:schemeClr val="tx1">
+                <a:lumMod val="95000"/>
+                <a:lumOff val="5000"/>
+              </a:schemeClr>
+            </a:solidFill>
+          </a:ln>
+        </p:spPr>
+        <p:style>
+          <a:lnRef idx="2">
+            <a:schemeClr val="accent5">
+              <a:shade val="15000"/>
+            </a:schemeClr>
+          </a:lnRef>
+          <a:fillRef idx="1">
+            <a:schemeClr val="accent5"/>
+          </a:fillRef>
+          <a:effectRef idx="0">
+            <a:schemeClr val="accent5"/>
+          </a:effectRef>
+          <a:fontRef idx="minor">
+            <a:schemeClr val="lt1"/>
+          </a:fontRef>
+        </p:style>
+        <p:txBody>
+          <a:bodyPr rtlCol="0" anchor="ctr"/>
+          <a:lstStyle/>
+          <a:p>
+            <a:pPr algn="ctr"/>
+            <a:endParaRPr lang="en-GB"/>
+          </a:p>
+        </p:txBody>
+      </p:sp>
+      <p:sp>
+        <p:nvSpPr>
+          <p:cNvPr id="5" name="Oval 4">
+            <a:extLst>
+              <a:ext uri="{FF2B5EF4-FFF2-40B4-BE49-F238E27FC236}">
+                <a16:creationId xmlns:a16="http://schemas.microsoft.com/office/drawing/2014/main" id="{F9699AF9-950A-EBFC-139C-E9FB62A05A31}"/>
+              </a:ext>
+            </a:extLst>
+          </p:cNvPr>
+          <p:cNvSpPr/>
+          <p:nvPr/>
+        </p:nvSpPr>
+        <p:spPr>
+          <a:xfrm>
+            <a:off x="3608982" y="2526703"/>
+            <a:ext cx="815788" cy="815788"/>
+          </a:xfrm>
+          <a:prstGeom prst="ellipse">
+            <a:avLst/>
+          </a:prstGeom>
+          <a:solidFill>
+            <a:srgbClr val="FFFFFF"/>
+          </a:solidFill>
+          <a:ln w="31750">
+            <a:solidFill>
+              <a:schemeClr val="tx1">
+                <a:lumMod val="95000"/>
+                <a:lumOff val="5000"/>
+              </a:schemeClr>
+            </a:solidFill>
+          </a:ln>
+        </p:spPr>
+        <p:style>
+          <a:lnRef idx="2">
+            <a:schemeClr val="accent5">
+              <a:shade val="15000"/>
+            </a:schemeClr>
+          </a:lnRef>
+          <a:fillRef idx="1">
+            <a:schemeClr val="accent5"/>
+          </a:fillRef>
+          <a:effectRef idx="0">
+            <a:schemeClr val="accent5"/>
+          </a:effectRef>
+          <a:fontRef idx="minor">
+            <a:schemeClr val="lt1"/>
+          </a:fontRef>
+        </p:style>
+        <p:txBody>
+          <a:bodyPr rtlCol="0" anchor="ctr"/>
+          <a:lstStyle/>
+          <a:p>
+            <a:pPr algn="ctr"/>
+            <a:endParaRPr lang="en-GB"/>
+          </a:p>
+        </p:txBody>
+      </p:sp>
+      <p:sp>
+        <p:nvSpPr>
+          <p:cNvPr id="6" name="Oval 5">
+            <a:extLst>
+              <a:ext uri="{FF2B5EF4-FFF2-40B4-BE49-F238E27FC236}">
+                <a16:creationId xmlns:a16="http://schemas.microsoft.com/office/drawing/2014/main" id="{CB35E459-61D9-3850-88CF-18FB4C6E8F5E}"/>
+              </a:ext>
+            </a:extLst>
+          </p:cNvPr>
+          <p:cNvSpPr/>
+          <p:nvPr/>
+        </p:nvSpPr>
+        <p:spPr>
+          <a:xfrm>
+            <a:off x="3608982" y="3624879"/>
+            <a:ext cx="815788" cy="815788"/>
+          </a:xfrm>
+          <a:prstGeom prst="ellipse">
+            <a:avLst/>
+          </a:prstGeom>
+          <a:solidFill>
+            <a:srgbClr val="FFFFFF"/>
+          </a:solidFill>
+          <a:ln w="31750">
+            <a:solidFill>
+              <a:schemeClr val="tx1">
+                <a:lumMod val="95000"/>
+                <a:lumOff val="5000"/>
+              </a:schemeClr>
+            </a:solidFill>
+          </a:ln>
+        </p:spPr>
+        <p:style>
+          <a:lnRef idx="2">
+            <a:schemeClr val="accent5">
+              <a:shade val="15000"/>
+            </a:schemeClr>
+          </a:lnRef>
+          <a:fillRef idx="1">
+            <a:schemeClr val="accent5"/>
+          </a:fillRef>
+          <a:effectRef idx="0">
+            <a:schemeClr val="accent5"/>
+          </a:effectRef>
+          <a:fontRef idx="minor">
+            <a:schemeClr val="lt1"/>
+          </a:fontRef>
+        </p:style>
+        <p:txBody>
+          <a:bodyPr rtlCol="0" anchor="ctr"/>
+          <a:lstStyle/>
+          <a:p>
+            <a:pPr algn="ctr"/>
+            <a:endParaRPr lang="en-GB" dirty="0"/>
+          </a:p>
+        </p:txBody>
+      </p:sp>
+      <p:sp>
+        <p:nvSpPr>
+          <p:cNvPr id="7" name="Oval 6">
+            <a:extLst>
+              <a:ext uri="{FF2B5EF4-FFF2-40B4-BE49-F238E27FC236}">
+                <a16:creationId xmlns:a16="http://schemas.microsoft.com/office/drawing/2014/main" id="{C9E6BA18-D58B-F0B1-BFA2-CB12D851FBC3}"/>
+              </a:ext>
+            </a:extLst>
+          </p:cNvPr>
+          <p:cNvSpPr/>
+          <p:nvPr/>
+        </p:nvSpPr>
+        <p:spPr>
+          <a:xfrm>
+            <a:off x="5284706" y="3189473"/>
+            <a:ext cx="815788" cy="815788"/>
+          </a:xfrm>
+          <a:prstGeom prst="ellipse">
+            <a:avLst/>
+          </a:prstGeom>
+          <a:solidFill>
+            <a:srgbClr val="FFFFFF"/>
+          </a:solidFill>
+          <a:ln w="31750">
+            <a:solidFill>
+              <a:schemeClr val="tx1">
+                <a:lumMod val="95000"/>
+                <a:lumOff val="5000"/>
+              </a:schemeClr>
+            </a:solidFill>
+          </a:ln>
+        </p:spPr>
+        <p:style>
+          <a:lnRef idx="2">
+            <a:schemeClr val="accent5">
+              <a:shade val="15000"/>
+            </a:schemeClr>
+          </a:lnRef>
+          <a:fillRef idx="1">
+            <a:schemeClr val="accent5"/>
+          </a:fillRef>
+          <a:effectRef idx="0">
+            <a:schemeClr val="accent5"/>
+          </a:effectRef>
+          <a:fontRef idx="minor">
+            <a:schemeClr val="lt1"/>
+          </a:fontRef>
+        </p:style>
+        <p:txBody>
+          <a:bodyPr rtlCol="0" anchor="ctr"/>
+          <a:lstStyle/>
+          <a:p>
+            <a:pPr algn="ctr"/>
+            <a:endParaRPr lang="en-GB"/>
+          </a:p>
+        </p:txBody>
+      </p:sp>
+      <p:sp>
+        <p:nvSpPr>
+          <p:cNvPr id="8" name="Oval 7">
+            <a:extLst>
+              <a:ext uri="{FF2B5EF4-FFF2-40B4-BE49-F238E27FC236}">
+                <a16:creationId xmlns:a16="http://schemas.microsoft.com/office/drawing/2014/main" id="{B568C77B-777C-83B7-8003-276C7EA6B394}"/>
+              </a:ext>
+            </a:extLst>
+          </p:cNvPr>
+          <p:cNvSpPr/>
+          <p:nvPr/>
+        </p:nvSpPr>
+        <p:spPr>
+          <a:xfrm>
+            <a:off x="5285232" y="2005519"/>
+            <a:ext cx="815788" cy="815788"/>
+          </a:xfrm>
+          <a:prstGeom prst="ellipse">
+            <a:avLst/>
+          </a:prstGeom>
+          <a:solidFill>
+            <a:srgbClr val="FFFFFF"/>
+          </a:solidFill>
+          <a:ln w="31750">
+            <a:solidFill>
+              <a:schemeClr val="tx1">
+                <a:lumMod val="95000"/>
+                <a:lumOff val="5000"/>
+              </a:schemeClr>
+            </a:solidFill>
+          </a:ln>
+        </p:spPr>
+        <p:style>
+          <a:lnRef idx="2">
+            <a:schemeClr val="accent5">
+              <a:shade val="15000"/>
+            </a:schemeClr>
+          </a:lnRef>
+          <a:fillRef idx="1">
+            <a:schemeClr val="accent5"/>
+          </a:fillRef>
+          <a:effectRef idx="0">
+            <a:schemeClr val="accent5"/>
+          </a:effectRef>
+          <a:fontRef idx="minor">
+            <a:schemeClr val="lt1"/>
+          </a:fontRef>
+        </p:style>
+        <p:txBody>
+          <a:bodyPr rtlCol="0" anchor="ctr"/>
+          <a:lstStyle/>
+          <a:p>
+            <a:pPr algn="ctr"/>
+            <a:endParaRPr lang="en-GB"/>
+          </a:p>
+        </p:txBody>
+      </p:sp>
+      <p:sp>
+        <p:nvSpPr>
+          <p:cNvPr id="9" name="Oval 8">
+            <a:extLst>
+              <a:ext uri="{FF2B5EF4-FFF2-40B4-BE49-F238E27FC236}">
+                <a16:creationId xmlns:a16="http://schemas.microsoft.com/office/drawing/2014/main" id="{9AC86C45-6E33-3D5A-8F8F-D0EF6F294356}"/>
+              </a:ext>
+            </a:extLst>
+          </p:cNvPr>
+          <p:cNvSpPr/>
+          <p:nvPr/>
+        </p:nvSpPr>
+        <p:spPr>
+          <a:xfrm>
+            <a:off x="5280210" y="811308"/>
+            <a:ext cx="815788" cy="815788"/>
+          </a:xfrm>
+          <a:prstGeom prst="ellipse">
+            <a:avLst/>
+          </a:prstGeom>
+          <a:solidFill>
+            <a:srgbClr val="FFFFFF"/>
+          </a:solidFill>
+          <a:ln w="31750">
+            <a:solidFill>
+              <a:schemeClr val="tx1">
+                <a:lumMod val="95000"/>
+                <a:lumOff val="5000"/>
+              </a:schemeClr>
+            </a:solidFill>
+          </a:ln>
+        </p:spPr>
+        <p:style>
+          <a:lnRef idx="2">
+            <a:schemeClr val="accent5">
+              <a:shade val="15000"/>
+            </a:schemeClr>
+          </a:lnRef>
+          <a:fillRef idx="1">
+            <a:schemeClr val="accent5"/>
+          </a:fillRef>
+          <a:effectRef idx="0">
+            <a:schemeClr val="accent5"/>
+          </a:effectRef>
+          <a:fontRef idx="minor">
+            <a:schemeClr val="lt1"/>
+          </a:fontRef>
+        </p:style>
+        <p:txBody>
+          <a:bodyPr rtlCol="0" anchor="ctr"/>
+          <a:lstStyle/>
+          <a:p>
+            <a:pPr algn="ctr"/>
+            <a:endParaRPr lang="en-GB"/>
+          </a:p>
+        </p:txBody>
+      </p:sp>
+      <p:sp>
+        <p:nvSpPr>
+          <p:cNvPr id="10" name="Oval 9">
+            <a:extLst>
+              <a:ext uri="{FF2B5EF4-FFF2-40B4-BE49-F238E27FC236}">
+                <a16:creationId xmlns:a16="http://schemas.microsoft.com/office/drawing/2014/main" id="{0BCD7AEF-573C-44EE-CE03-26A343834356}"/>
+              </a:ext>
+            </a:extLst>
+          </p:cNvPr>
+          <p:cNvSpPr/>
+          <p:nvPr/>
+        </p:nvSpPr>
+        <p:spPr>
+          <a:xfrm>
+            <a:off x="6929715" y="1443319"/>
+            <a:ext cx="815788" cy="815788"/>
+          </a:xfrm>
+          <a:prstGeom prst="ellipse">
+            <a:avLst/>
+          </a:prstGeom>
+          <a:solidFill>
+            <a:srgbClr val="FFFFFF"/>
+          </a:solidFill>
+          <a:ln w="31750">
+            <a:solidFill>
+              <a:schemeClr val="tx1">
+                <a:lumMod val="95000"/>
+                <a:lumOff val="5000"/>
+              </a:schemeClr>
+            </a:solidFill>
+          </a:ln>
+        </p:spPr>
+        <p:style>
+          <a:lnRef idx="2">
+            <a:schemeClr val="accent5">
+              <a:shade val="15000"/>
+            </a:schemeClr>
+          </a:lnRef>
+          <a:fillRef idx="1">
+            <a:schemeClr val="accent5"/>
+          </a:fillRef>
+          <a:effectRef idx="0">
+            <a:schemeClr val="accent5"/>
+          </a:effectRef>
+          <a:fontRef idx="minor">
+            <a:schemeClr val="lt1"/>
+          </a:fontRef>
+        </p:style>
+        <p:txBody>
+          <a:bodyPr rtlCol="0" anchor="ctr"/>
+          <a:lstStyle/>
+          <a:p>
+            <a:pPr algn="ctr"/>
+            <a:endParaRPr lang="en-GB"/>
+          </a:p>
+        </p:txBody>
+      </p:sp>
+      <p:sp>
+        <p:nvSpPr>
+          <p:cNvPr id="11" name="Oval 10">
+            <a:extLst>
+              <a:ext uri="{FF2B5EF4-FFF2-40B4-BE49-F238E27FC236}">
+                <a16:creationId xmlns:a16="http://schemas.microsoft.com/office/drawing/2014/main" id="{7FC72D31-4E51-1CB0-4AF1-6E7BE6C98977}"/>
+              </a:ext>
+            </a:extLst>
+          </p:cNvPr>
+          <p:cNvSpPr/>
+          <p:nvPr/>
+        </p:nvSpPr>
+        <p:spPr>
+          <a:xfrm>
+            <a:off x="6929715" y="2541495"/>
+            <a:ext cx="815788" cy="815788"/>
+          </a:xfrm>
+          <a:prstGeom prst="ellipse">
+            <a:avLst/>
+          </a:prstGeom>
+          <a:solidFill>
+            <a:srgbClr val="FFFFFF"/>
+          </a:solidFill>
+          <a:ln w="31750">
+            <a:solidFill>
+              <a:schemeClr val="tx1">
+                <a:lumMod val="95000"/>
+                <a:lumOff val="5000"/>
+              </a:schemeClr>
+            </a:solidFill>
+          </a:ln>
+        </p:spPr>
+        <p:style>
+          <a:lnRef idx="2">
+            <a:schemeClr val="accent5">
+              <a:shade val="15000"/>
+            </a:schemeClr>
+          </a:lnRef>
+          <a:fillRef idx="1">
+            <a:schemeClr val="accent5"/>
+          </a:fillRef>
+          <a:effectRef idx="0">
+            <a:schemeClr val="accent5"/>
+          </a:effectRef>
+          <a:fontRef idx="minor">
+            <a:schemeClr val="lt1"/>
+          </a:fontRef>
+        </p:style>
+        <p:txBody>
+          <a:bodyPr rtlCol="0" anchor="ctr"/>
+          <a:lstStyle/>
+          <a:p>
+            <a:pPr algn="ctr"/>
+            <a:endParaRPr lang="en-GB"/>
+          </a:p>
+        </p:txBody>
+      </p:sp>
+      <p:sp>
+        <p:nvSpPr>
+          <p:cNvPr id="12" name="Oval 11">
+            <a:extLst>
+              <a:ext uri="{FF2B5EF4-FFF2-40B4-BE49-F238E27FC236}">
+                <a16:creationId xmlns:a16="http://schemas.microsoft.com/office/drawing/2014/main" id="{8E845950-34BB-E31C-5BE5-A9CF82F7E225}"/>
+              </a:ext>
+            </a:extLst>
+          </p:cNvPr>
+          <p:cNvSpPr/>
+          <p:nvPr/>
+        </p:nvSpPr>
+        <p:spPr>
+          <a:xfrm>
+            <a:off x="6929715" y="3639671"/>
+            <a:ext cx="815788" cy="815788"/>
+          </a:xfrm>
+          <a:prstGeom prst="ellipse">
+            <a:avLst/>
+          </a:prstGeom>
+          <a:solidFill>
+            <a:srgbClr val="FFFFFF"/>
+          </a:solidFill>
+          <a:ln w="31750">
+            <a:solidFill>
+              <a:schemeClr val="tx1">
+                <a:lumMod val="95000"/>
+                <a:lumOff val="5000"/>
+              </a:schemeClr>
+            </a:solidFill>
+          </a:ln>
+        </p:spPr>
+        <p:style>
+          <a:lnRef idx="2">
+            <a:schemeClr val="accent5">
+              <a:shade val="15000"/>
+            </a:schemeClr>
+          </a:lnRef>
+          <a:fillRef idx="1">
+            <a:schemeClr val="accent5"/>
+          </a:fillRef>
+          <a:effectRef idx="0">
+            <a:schemeClr val="accent5"/>
+          </a:effectRef>
+          <a:fontRef idx="minor">
+            <a:schemeClr val="lt1"/>
+          </a:fontRef>
+        </p:style>
+        <p:txBody>
+          <a:bodyPr rtlCol="0" anchor="ctr"/>
+          <a:lstStyle/>
+          <a:p>
+            <a:pPr algn="ctr"/>
+            <a:endParaRPr lang="en-GB"/>
+          </a:p>
+        </p:txBody>
+      </p:sp>
+      <p:cxnSp>
+        <p:nvCxnSpPr>
+          <p:cNvPr id="13" name="Straight Arrow Connector 12">
+            <a:extLst>
+              <a:ext uri="{FF2B5EF4-FFF2-40B4-BE49-F238E27FC236}">
+                <a16:creationId xmlns:a16="http://schemas.microsoft.com/office/drawing/2014/main" id="{C57E8447-B954-EA24-CD6D-CB03AE3F9E42}"/>
+              </a:ext>
+            </a:extLst>
+          </p:cNvPr>
+          <p:cNvCxnSpPr>
+            <a:cxnSpLocks/>
+          </p:cNvCxnSpPr>
+          <p:nvPr/>
+        </p:nvCxnSpPr>
+        <p:spPr>
+          <a:xfrm>
+            <a:off x="4503194" y="1851212"/>
+            <a:ext cx="720315" cy="582707"/>
+          </a:xfrm>
+          <a:prstGeom prst="straightConnector1">
+            <a:avLst/>
+          </a:prstGeom>
+          <a:ln w="12700">
+            <a:solidFill>
+              <a:schemeClr val="tx1">
+                <a:lumMod val="95000"/>
+                <a:lumOff val="5000"/>
+              </a:schemeClr>
+            </a:solidFill>
+            <a:tailEnd type="triangle"/>
+          </a:ln>
+        </p:spPr>
+        <p:style>
+          <a:lnRef idx="3">
+            <a:schemeClr val="dk1"/>
+          </a:lnRef>
+          <a:fillRef idx="0">
+            <a:schemeClr val="dk1"/>
+          </a:fillRef>
+          <a:effectRef idx="2">
+            <a:schemeClr val="dk1"/>
+          </a:effectRef>
+          <a:fontRef idx="minor">
+            <a:schemeClr val="tx1"/>
+          </a:fontRef>
+        </p:style>
+      </p:cxnSp>
+      <p:cxnSp>
+        <p:nvCxnSpPr>
+          <p:cNvPr id="14" name="Straight Arrow Connector 13">
+            <a:extLst>
+              <a:ext uri="{FF2B5EF4-FFF2-40B4-BE49-F238E27FC236}">
+                <a16:creationId xmlns:a16="http://schemas.microsoft.com/office/drawing/2014/main" id="{CA3BF170-8391-D95E-C3D4-5DC993128554}"/>
+              </a:ext>
+            </a:extLst>
+          </p:cNvPr>
+          <p:cNvCxnSpPr>
+            <a:cxnSpLocks/>
+          </p:cNvCxnSpPr>
+          <p:nvPr/>
+        </p:nvCxnSpPr>
+        <p:spPr>
+          <a:xfrm flipV="1">
+            <a:off x="4503194" y="1219202"/>
+            <a:ext cx="720315" cy="632011"/>
+          </a:xfrm>
+          <a:prstGeom prst="straightConnector1">
+            <a:avLst/>
+          </a:prstGeom>
+          <a:ln w="12700">
+            <a:solidFill>
+              <a:schemeClr val="tx1">
+                <a:lumMod val="95000"/>
+                <a:lumOff val="5000"/>
+              </a:schemeClr>
+            </a:solidFill>
+            <a:tailEnd type="triangle"/>
+          </a:ln>
+        </p:spPr>
+        <p:style>
+          <a:lnRef idx="3">
+            <a:schemeClr val="dk1"/>
+          </a:lnRef>
+          <a:fillRef idx="0">
+            <a:schemeClr val="dk1"/>
+          </a:fillRef>
+          <a:effectRef idx="2">
+            <a:schemeClr val="dk1"/>
+          </a:effectRef>
+          <a:fontRef idx="minor">
+            <a:schemeClr val="tx1"/>
+          </a:fontRef>
+        </p:style>
+      </p:cxnSp>
+      <p:cxnSp>
+        <p:nvCxnSpPr>
+          <p:cNvPr id="15" name="Straight Arrow Connector 14">
+            <a:extLst>
+              <a:ext uri="{FF2B5EF4-FFF2-40B4-BE49-F238E27FC236}">
+                <a16:creationId xmlns:a16="http://schemas.microsoft.com/office/drawing/2014/main" id="{E1A5E366-1060-1532-C14D-721F626D5DAE}"/>
+              </a:ext>
+            </a:extLst>
+          </p:cNvPr>
+          <p:cNvCxnSpPr>
+            <a:cxnSpLocks/>
+          </p:cNvCxnSpPr>
+          <p:nvPr/>
+        </p:nvCxnSpPr>
+        <p:spPr>
+          <a:xfrm>
+            <a:off x="4503194" y="1851211"/>
+            <a:ext cx="720315" cy="1635612"/>
+          </a:xfrm>
+          <a:prstGeom prst="straightConnector1">
+            <a:avLst/>
+          </a:prstGeom>
+          <a:ln w="12700">
+            <a:solidFill>
+              <a:schemeClr val="tx1">
+                <a:lumMod val="95000"/>
+                <a:lumOff val="5000"/>
+              </a:schemeClr>
+            </a:solidFill>
+            <a:tailEnd type="triangle"/>
+          </a:ln>
+        </p:spPr>
+        <p:style>
+          <a:lnRef idx="3">
+            <a:schemeClr val="dk1"/>
+          </a:lnRef>
+          <a:fillRef idx="0">
+            <a:schemeClr val="dk1"/>
+          </a:fillRef>
+          <a:effectRef idx="2">
+            <a:schemeClr val="dk1"/>
+          </a:effectRef>
+          <a:fontRef idx="minor">
+            <a:schemeClr val="tx1"/>
+          </a:fontRef>
+        </p:style>
+      </p:cxnSp>
+      <p:cxnSp>
+        <p:nvCxnSpPr>
+          <p:cNvPr id="16" name="Straight Arrow Connector 15">
+            <a:extLst>
+              <a:ext uri="{FF2B5EF4-FFF2-40B4-BE49-F238E27FC236}">
+                <a16:creationId xmlns:a16="http://schemas.microsoft.com/office/drawing/2014/main" id="{812A00AD-7FCE-5B94-2610-609A8A8D26EE}"/>
+              </a:ext>
+            </a:extLst>
+          </p:cNvPr>
+          <p:cNvCxnSpPr>
+            <a:cxnSpLocks/>
+          </p:cNvCxnSpPr>
+          <p:nvPr/>
+        </p:nvCxnSpPr>
+        <p:spPr>
+          <a:xfrm>
+            <a:off x="4503193" y="1854800"/>
+            <a:ext cx="724814" cy="2772483"/>
+          </a:xfrm>
+          <a:prstGeom prst="straightConnector1">
+            <a:avLst/>
+          </a:prstGeom>
+          <a:ln w="12700">
+            <a:solidFill>
+              <a:schemeClr val="tx1">
+                <a:lumMod val="95000"/>
+                <a:lumOff val="5000"/>
+              </a:schemeClr>
+            </a:solidFill>
+            <a:tailEnd type="triangle"/>
+          </a:ln>
+        </p:spPr>
+        <p:style>
+          <a:lnRef idx="3">
+            <a:schemeClr val="dk1"/>
+          </a:lnRef>
+          <a:fillRef idx="0">
+            <a:schemeClr val="dk1"/>
+          </a:fillRef>
+          <a:effectRef idx="2">
+            <a:schemeClr val="dk1"/>
+          </a:effectRef>
+          <a:fontRef idx="minor">
+            <a:schemeClr val="tx1"/>
+          </a:fontRef>
+        </p:style>
+      </p:cxnSp>
+      <p:cxnSp>
+        <p:nvCxnSpPr>
+          <p:cNvPr id="17" name="Straight Arrow Connector 16">
+            <a:extLst>
+              <a:ext uri="{FF2B5EF4-FFF2-40B4-BE49-F238E27FC236}">
+                <a16:creationId xmlns:a16="http://schemas.microsoft.com/office/drawing/2014/main" id="{F48F14D4-61BF-72F7-3695-91DD4079AAA7}"/>
+              </a:ext>
+            </a:extLst>
+          </p:cNvPr>
+          <p:cNvCxnSpPr>
+            <a:cxnSpLocks/>
+          </p:cNvCxnSpPr>
+          <p:nvPr/>
+        </p:nvCxnSpPr>
+        <p:spPr>
+          <a:xfrm>
+            <a:off x="4503193" y="2949389"/>
+            <a:ext cx="720316" cy="1801458"/>
+          </a:xfrm>
+          <a:prstGeom prst="straightConnector1">
+            <a:avLst/>
+          </a:prstGeom>
+          <a:ln w="12700">
+            <a:solidFill>
+              <a:schemeClr val="tx1">
+                <a:lumMod val="95000"/>
+                <a:lumOff val="5000"/>
+              </a:schemeClr>
+            </a:solidFill>
+            <a:tailEnd type="triangle"/>
+          </a:ln>
+        </p:spPr>
+        <p:style>
+          <a:lnRef idx="3">
+            <a:schemeClr val="dk1"/>
+          </a:lnRef>
+          <a:fillRef idx="0">
+            <a:schemeClr val="dk1"/>
+          </a:fillRef>
+          <a:effectRef idx="2">
+            <a:schemeClr val="dk1"/>
+          </a:effectRef>
+          <a:fontRef idx="minor">
+            <a:schemeClr val="tx1"/>
+          </a:fontRef>
+        </p:style>
+      </p:cxnSp>
+      <p:cxnSp>
+        <p:nvCxnSpPr>
+          <p:cNvPr id="18" name="Straight Arrow Connector 17">
+            <a:extLst>
+              <a:ext uri="{FF2B5EF4-FFF2-40B4-BE49-F238E27FC236}">
+                <a16:creationId xmlns:a16="http://schemas.microsoft.com/office/drawing/2014/main" id="{E1B4B213-B5A1-6D6A-5397-734720F840A0}"/>
+              </a:ext>
+            </a:extLst>
+          </p:cNvPr>
+          <p:cNvCxnSpPr>
+            <a:cxnSpLocks/>
+          </p:cNvCxnSpPr>
+          <p:nvPr/>
+        </p:nvCxnSpPr>
+        <p:spPr>
+          <a:xfrm flipV="1">
+            <a:off x="4513837" y="2433919"/>
+            <a:ext cx="709672" cy="496646"/>
+          </a:xfrm>
+          <a:prstGeom prst="straightConnector1">
+            <a:avLst/>
+          </a:prstGeom>
+          <a:ln w="12700">
+            <a:solidFill>
+              <a:schemeClr val="tx1">
+                <a:lumMod val="95000"/>
+                <a:lumOff val="5000"/>
+              </a:schemeClr>
+            </a:solidFill>
+            <a:tailEnd type="triangle"/>
+          </a:ln>
+        </p:spPr>
+        <p:style>
+          <a:lnRef idx="3">
+            <a:schemeClr val="dk1"/>
+          </a:lnRef>
+          <a:fillRef idx="0">
+            <a:schemeClr val="dk1"/>
+          </a:fillRef>
+          <a:effectRef idx="2">
+            <a:schemeClr val="dk1"/>
+          </a:effectRef>
+          <a:fontRef idx="minor">
+            <a:schemeClr val="tx1"/>
+          </a:fontRef>
+        </p:style>
+      </p:cxnSp>
+      <p:cxnSp>
+        <p:nvCxnSpPr>
+          <p:cNvPr id="19" name="Straight Arrow Connector 18">
+            <a:extLst>
+              <a:ext uri="{FF2B5EF4-FFF2-40B4-BE49-F238E27FC236}">
+                <a16:creationId xmlns:a16="http://schemas.microsoft.com/office/drawing/2014/main" id="{A1668E91-2F05-2F13-6293-E7224A66256C}"/>
+              </a:ext>
+            </a:extLst>
+          </p:cNvPr>
+          <p:cNvCxnSpPr>
+            <a:cxnSpLocks/>
+          </p:cNvCxnSpPr>
+          <p:nvPr/>
+        </p:nvCxnSpPr>
+        <p:spPr>
+          <a:xfrm>
+            <a:off x="4511706" y="2945802"/>
+            <a:ext cx="711803" cy="582706"/>
+          </a:xfrm>
+          <a:prstGeom prst="straightConnector1">
+            <a:avLst/>
+          </a:prstGeom>
+          <a:ln w="12700">
+            <a:solidFill>
+              <a:schemeClr val="tx1">
+                <a:lumMod val="95000"/>
+                <a:lumOff val="5000"/>
+              </a:schemeClr>
+            </a:solidFill>
+            <a:tailEnd type="triangle"/>
+          </a:ln>
+        </p:spPr>
+        <p:style>
+          <a:lnRef idx="3">
+            <a:schemeClr val="dk1"/>
+          </a:lnRef>
+          <a:fillRef idx="0">
+            <a:schemeClr val="dk1"/>
+          </a:fillRef>
+          <a:effectRef idx="2">
+            <a:schemeClr val="dk1"/>
+          </a:effectRef>
+          <a:fontRef idx="minor">
+            <a:schemeClr val="tx1"/>
+          </a:fontRef>
+        </p:style>
+      </p:cxnSp>
+      <p:cxnSp>
+        <p:nvCxnSpPr>
+          <p:cNvPr id="20" name="Straight Arrow Connector 19">
+            <a:extLst>
+              <a:ext uri="{FF2B5EF4-FFF2-40B4-BE49-F238E27FC236}">
+                <a16:creationId xmlns:a16="http://schemas.microsoft.com/office/drawing/2014/main" id="{65231989-1C2B-56EB-4792-CFC5A860082B}"/>
+              </a:ext>
+            </a:extLst>
+          </p:cNvPr>
+          <p:cNvCxnSpPr>
+            <a:cxnSpLocks/>
+          </p:cNvCxnSpPr>
+          <p:nvPr/>
+        </p:nvCxnSpPr>
+        <p:spPr>
+          <a:xfrm flipV="1">
+            <a:off x="4503192" y="1264359"/>
+            <a:ext cx="720317" cy="1676514"/>
+          </a:xfrm>
+          <a:prstGeom prst="straightConnector1">
+            <a:avLst/>
+          </a:prstGeom>
+          <a:ln w="12700">
+            <a:solidFill>
+              <a:schemeClr val="tx1">
+                <a:lumMod val="95000"/>
+                <a:lumOff val="5000"/>
+              </a:schemeClr>
+            </a:solidFill>
+            <a:tailEnd type="triangle"/>
+          </a:ln>
+        </p:spPr>
+        <p:style>
+          <a:lnRef idx="3">
+            <a:schemeClr val="dk1"/>
+          </a:lnRef>
+          <a:fillRef idx="0">
+            <a:schemeClr val="dk1"/>
+          </a:fillRef>
+          <a:effectRef idx="2">
+            <a:schemeClr val="dk1"/>
+          </a:effectRef>
+          <a:fontRef idx="minor">
+            <a:schemeClr val="tx1"/>
+          </a:fontRef>
+        </p:style>
+      </p:cxnSp>
+      <p:cxnSp>
+        <p:nvCxnSpPr>
+          <p:cNvPr id="21" name="Straight Arrow Connector 20">
+            <a:extLst>
+              <a:ext uri="{FF2B5EF4-FFF2-40B4-BE49-F238E27FC236}">
+                <a16:creationId xmlns:a16="http://schemas.microsoft.com/office/drawing/2014/main" id="{DE53F76F-C910-3CA2-8D6B-3DBA2B482124}"/>
+              </a:ext>
+            </a:extLst>
+          </p:cNvPr>
+          <p:cNvCxnSpPr>
+            <a:cxnSpLocks/>
+          </p:cNvCxnSpPr>
+          <p:nvPr/>
+        </p:nvCxnSpPr>
+        <p:spPr>
+          <a:xfrm>
+            <a:off x="4511706" y="4047565"/>
+            <a:ext cx="711803" cy="815788"/>
+          </a:xfrm>
+          <a:prstGeom prst="straightConnector1">
+            <a:avLst/>
+          </a:prstGeom>
+          <a:ln w="12700">
+            <a:solidFill>
+              <a:schemeClr val="tx1">
+                <a:lumMod val="95000"/>
+                <a:lumOff val="5000"/>
+              </a:schemeClr>
+            </a:solidFill>
+            <a:tailEnd type="triangle"/>
+          </a:ln>
+        </p:spPr>
+        <p:style>
+          <a:lnRef idx="3">
+            <a:schemeClr val="dk1"/>
+          </a:lnRef>
+          <a:fillRef idx="0">
+            <a:schemeClr val="dk1"/>
+          </a:fillRef>
+          <a:effectRef idx="2">
+            <a:schemeClr val="dk1"/>
+          </a:effectRef>
+          <a:fontRef idx="minor">
+            <a:schemeClr val="tx1"/>
+          </a:fontRef>
+        </p:style>
+      </p:cxnSp>
+      <p:cxnSp>
+        <p:nvCxnSpPr>
+          <p:cNvPr id="22" name="Straight Arrow Connector 21">
+            <a:extLst>
+              <a:ext uri="{FF2B5EF4-FFF2-40B4-BE49-F238E27FC236}">
+                <a16:creationId xmlns:a16="http://schemas.microsoft.com/office/drawing/2014/main" id="{50D91EE3-BEC5-D2D1-DB12-E6ED1AA21748}"/>
+              </a:ext>
+            </a:extLst>
+          </p:cNvPr>
+          <p:cNvCxnSpPr>
+            <a:cxnSpLocks/>
+          </p:cNvCxnSpPr>
+          <p:nvPr/>
+        </p:nvCxnSpPr>
+        <p:spPr>
+          <a:xfrm flipV="1">
+            <a:off x="4511704" y="3537024"/>
+            <a:ext cx="711805" cy="510541"/>
+          </a:xfrm>
+          <a:prstGeom prst="straightConnector1">
+            <a:avLst/>
+          </a:prstGeom>
+          <a:ln w="12700">
+            <a:solidFill>
+              <a:schemeClr val="tx1">
+                <a:lumMod val="95000"/>
+                <a:lumOff val="5000"/>
+              </a:schemeClr>
+            </a:solidFill>
+            <a:tailEnd type="triangle"/>
+          </a:ln>
+        </p:spPr>
+        <p:style>
+          <a:lnRef idx="3">
+            <a:schemeClr val="dk1"/>
+          </a:lnRef>
+          <a:fillRef idx="0">
+            <a:schemeClr val="dk1"/>
+          </a:fillRef>
+          <a:effectRef idx="2">
+            <a:schemeClr val="dk1"/>
+          </a:effectRef>
+          <a:fontRef idx="minor">
+            <a:schemeClr val="tx1"/>
+          </a:fontRef>
+        </p:style>
+      </p:cxnSp>
+      <p:cxnSp>
+        <p:nvCxnSpPr>
+          <p:cNvPr id="23" name="Straight Arrow Connector 22">
+            <a:extLst>
+              <a:ext uri="{FF2B5EF4-FFF2-40B4-BE49-F238E27FC236}">
+                <a16:creationId xmlns:a16="http://schemas.microsoft.com/office/drawing/2014/main" id="{53B8063B-DE36-DAF8-5DC5-0A954E7C0B19}"/>
+              </a:ext>
+            </a:extLst>
+          </p:cNvPr>
+          <p:cNvCxnSpPr>
+            <a:cxnSpLocks/>
+          </p:cNvCxnSpPr>
+          <p:nvPr/>
+        </p:nvCxnSpPr>
+        <p:spPr>
+          <a:xfrm flipV="1">
+            <a:off x="4529968" y="2476390"/>
+            <a:ext cx="693541" cy="1589552"/>
+          </a:xfrm>
+          <a:prstGeom prst="straightConnector1">
+            <a:avLst/>
+          </a:prstGeom>
+          <a:ln w="12700">
+            <a:solidFill>
+              <a:schemeClr val="tx1">
+                <a:lumMod val="95000"/>
+                <a:lumOff val="5000"/>
+              </a:schemeClr>
+            </a:solidFill>
+            <a:tailEnd type="triangle"/>
+          </a:ln>
+        </p:spPr>
+        <p:style>
+          <a:lnRef idx="3">
+            <a:schemeClr val="dk1"/>
+          </a:lnRef>
+          <a:fillRef idx="0">
+            <a:schemeClr val="dk1"/>
+          </a:fillRef>
+          <a:effectRef idx="2">
+            <a:schemeClr val="dk1"/>
+          </a:effectRef>
+          <a:fontRef idx="minor">
+            <a:schemeClr val="tx1"/>
+          </a:fontRef>
+        </p:style>
+      </p:cxnSp>
+      <p:cxnSp>
+        <p:nvCxnSpPr>
+          <p:cNvPr id="24" name="Straight Arrow Connector 23">
+            <a:extLst>
+              <a:ext uri="{FF2B5EF4-FFF2-40B4-BE49-F238E27FC236}">
+                <a16:creationId xmlns:a16="http://schemas.microsoft.com/office/drawing/2014/main" id="{249E48B1-9A44-13F4-58EF-41844079D3C6}"/>
+              </a:ext>
+            </a:extLst>
+          </p:cNvPr>
+          <p:cNvCxnSpPr>
+            <a:cxnSpLocks/>
+          </p:cNvCxnSpPr>
+          <p:nvPr/>
+        </p:nvCxnSpPr>
+        <p:spPr>
+          <a:xfrm flipV="1">
+            <a:off x="4518538" y="1359554"/>
+            <a:ext cx="713482" cy="2698098"/>
+          </a:xfrm>
+          <a:prstGeom prst="straightConnector1">
+            <a:avLst/>
+          </a:prstGeom>
+          <a:ln w="12700">
+            <a:solidFill>
+              <a:schemeClr val="tx1">
+                <a:lumMod val="95000"/>
+                <a:lumOff val="5000"/>
+              </a:schemeClr>
+            </a:solidFill>
+            <a:tailEnd type="triangle"/>
+          </a:ln>
+        </p:spPr>
+        <p:style>
+          <a:lnRef idx="3">
+            <a:schemeClr val="dk1"/>
+          </a:lnRef>
+          <a:fillRef idx="0">
+            <a:schemeClr val="dk1"/>
+          </a:fillRef>
+          <a:effectRef idx="2">
+            <a:schemeClr val="dk1"/>
+          </a:effectRef>
+          <a:fontRef idx="minor">
+            <a:schemeClr val="tx1"/>
+          </a:fontRef>
+        </p:style>
+      </p:cxnSp>
+      <p:cxnSp>
+        <p:nvCxnSpPr>
+          <p:cNvPr id="25" name="Straight Arrow Connector 24">
+            <a:extLst>
+              <a:ext uri="{FF2B5EF4-FFF2-40B4-BE49-F238E27FC236}">
+                <a16:creationId xmlns:a16="http://schemas.microsoft.com/office/drawing/2014/main" id="{B7CCE6EE-EC37-B5A4-6DA7-B44D532975EC}"/>
+              </a:ext>
+            </a:extLst>
+          </p:cNvPr>
+          <p:cNvCxnSpPr>
+            <a:cxnSpLocks/>
+          </p:cNvCxnSpPr>
+          <p:nvPr/>
+        </p:nvCxnSpPr>
+        <p:spPr>
+          <a:xfrm flipV="1">
+            <a:off x="6152697" y="2930565"/>
+            <a:ext cx="720319" cy="727035"/>
+          </a:xfrm>
+          <a:prstGeom prst="straightConnector1">
+            <a:avLst/>
+          </a:prstGeom>
+          <a:ln w="12700">
+            <a:solidFill>
+              <a:schemeClr val="tx1">
+                <a:lumMod val="95000"/>
+                <a:lumOff val="5000"/>
+              </a:schemeClr>
+            </a:solidFill>
+            <a:tailEnd type="triangle"/>
+          </a:ln>
+        </p:spPr>
+        <p:style>
+          <a:lnRef idx="3">
+            <a:schemeClr val="dk1"/>
+          </a:lnRef>
+          <a:fillRef idx="0">
+            <a:schemeClr val="dk1"/>
+          </a:fillRef>
+          <a:effectRef idx="2">
+            <a:schemeClr val="dk1"/>
+          </a:effectRef>
+          <a:fontRef idx="minor">
+            <a:schemeClr val="tx1"/>
+          </a:fontRef>
+        </p:style>
+      </p:cxnSp>
+      <p:cxnSp>
+        <p:nvCxnSpPr>
+          <p:cNvPr id="26" name="Straight Arrow Connector 25">
+            <a:extLst>
+              <a:ext uri="{FF2B5EF4-FFF2-40B4-BE49-F238E27FC236}">
+                <a16:creationId xmlns:a16="http://schemas.microsoft.com/office/drawing/2014/main" id="{AA63CD7E-C0E6-5989-6B97-E15BA21ED439}"/>
+              </a:ext>
+            </a:extLst>
+          </p:cNvPr>
+          <p:cNvCxnSpPr>
+            <a:cxnSpLocks/>
+          </p:cNvCxnSpPr>
+          <p:nvPr/>
+        </p:nvCxnSpPr>
+        <p:spPr>
+          <a:xfrm>
+            <a:off x="6142721" y="3648636"/>
+            <a:ext cx="730295" cy="398929"/>
+          </a:xfrm>
+          <a:prstGeom prst="straightConnector1">
+            <a:avLst/>
+          </a:prstGeom>
+          <a:ln w="12700">
+            <a:solidFill>
+              <a:schemeClr val="tx1">
+                <a:lumMod val="95000"/>
+                <a:lumOff val="5000"/>
+              </a:schemeClr>
+            </a:solidFill>
+            <a:tailEnd type="triangle"/>
+          </a:ln>
+        </p:spPr>
+        <p:style>
+          <a:lnRef idx="3">
+            <a:schemeClr val="dk1"/>
+          </a:lnRef>
+          <a:fillRef idx="0">
+            <a:schemeClr val="dk1"/>
+          </a:fillRef>
+          <a:effectRef idx="2">
+            <a:schemeClr val="dk1"/>
+          </a:effectRef>
+          <a:fontRef idx="minor">
+            <a:schemeClr val="tx1"/>
+          </a:fontRef>
+        </p:style>
+      </p:cxnSp>
+      <p:cxnSp>
+        <p:nvCxnSpPr>
+          <p:cNvPr id="27" name="Straight Arrow Connector 26">
+            <a:extLst>
+              <a:ext uri="{FF2B5EF4-FFF2-40B4-BE49-F238E27FC236}">
+                <a16:creationId xmlns:a16="http://schemas.microsoft.com/office/drawing/2014/main" id="{9FA86FEE-F736-D559-1D15-FF19EB3A84A6}"/>
+              </a:ext>
+            </a:extLst>
+          </p:cNvPr>
+          <p:cNvCxnSpPr>
+            <a:cxnSpLocks/>
+          </p:cNvCxnSpPr>
+          <p:nvPr/>
+        </p:nvCxnSpPr>
+        <p:spPr>
+          <a:xfrm flipV="1">
+            <a:off x="6142721" y="1963747"/>
+            <a:ext cx="670007" cy="1693853"/>
+          </a:xfrm>
+          <a:prstGeom prst="straightConnector1">
+            <a:avLst/>
+          </a:prstGeom>
+          <a:ln w="12700">
+            <a:solidFill>
+              <a:schemeClr val="tx1">
+                <a:lumMod val="95000"/>
+                <a:lumOff val="5000"/>
+              </a:schemeClr>
+            </a:solidFill>
+            <a:tailEnd type="triangle"/>
+          </a:ln>
+        </p:spPr>
+        <p:style>
+          <a:lnRef idx="3">
+            <a:schemeClr val="dk1"/>
+          </a:lnRef>
+          <a:fillRef idx="0">
+            <a:schemeClr val="dk1"/>
+          </a:fillRef>
+          <a:effectRef idx="2">
+            <a:schemeClr val="dk1"/>
+          </a:effectRef>
+          <a:fontRef idx="minor">
+            <a:schemeClr val="tx1"/>
+          </a:fontRef>
+        </p:style>
+      </p:cxnSp>
+      <p:cxnSp>
+        <p:nvCxnSpPr>
+          <p:cNvPr id="28" name="Straight Arrow Connector 27">
+            <a:extLst>
+              <a:ext uri="{FF2B5EF4-FFF2-40B4-BE49-F238E27FC236}">
+                <a16:creationId xmlns:a16="http://schemas.microsoft.com/office/drawing/2014/main" id="{82C97418-CAC9-1A5D-648B-684A2AF6F284}"/>
+              </a:ext>
+            </a:extLst>
+          </p:cNvPr>
+          <p:cNvCxnSpPr>
+            <a:cxnSpLocks/>
+          </p:cNvCxnSpPr>
+          <p:nvPr/>
+        </p:nvCxnSpPr>
+        <p:spPr>
+          <a:xfrm flipV="1">
+            <a:off x="6152697" y="4047565"/>
+            <a:ext cx="720319" cy="815788"/>
+          </a:xfrm>
+          <a:prstGeom prst="straightConnector1">
+            <a:avLst/>
+          </a:prstGeom>
+          <a:ln w="12700">
+            <a:solidFill>
+              <a:schemeClr val="tx1">
+                <a:lumMod val="95000"/>
+                <a:lumOff val="5000"/>
+              </a:schemeClr>
+            </a:solidFill>
+            <a:tailEnd type="triangle"/>
+          </a:ln>
+        </p:spPr>
+        <p:style>
+          <a:lnRef idx="3">
+            <a:schemeClr val="dk1"/>
+          </a:lnRef>
+          <a:fillRef idx="0">
+            <a:schemeClr val="dk1"/>
+          </a:fillRef>
+          <a:effectRef idx="2">
+            <a:schemeClr val="dk1"/>
+          </a:effectRef>
+          <a:fontRef idx="minor">
+            <a:schemeClr val="tx1"/>
+          </a:fontRef>
+        </p:style>
+      </p:cxnSp>
+      <p:cxnSp>
+        <p:nvCxnSpPr>
+          <p:cNvPr id="29" name="Straight Arrow Connector 28">
+            <a:extLst>
+              <a:ext uri="{FF2B5EF4-FFF2-40B4-BE49-F238E27FC236}">
+                <a16:creationId xmlns:a16="http://schemas.microsoft.com/office/drawing/2014/main" id="{D93EFF42-4806-1A15-F057-49F79E594B8E}"/>
+              </a:ext>
+            </a:extLst>
+          </p:cNvPr>
+          <p:cNvCxnSpPr>
+            <a:cxnSpLocks/>
+          </p:cNvCxnSpPr>
+          <p:nvPr/>
+        </p:nvCxnSpPr>
+        <p:spPr>
+          <a:xfrm flipV="1">
+            <a:off x="6152697" y="3022003"/>
+            <a:ext cx="720319" cy="1841350"/>
+          </a:xfrm>
+          <a:prstGeom prst="straightConnector1">
+            <a:avLst/>
+          </a:prstGeom>
+          <a:ln w="12700">
+            <a:solidFill>
+              <a:schemeClr val="tx1">
+                <a:lumMod val="95000"/>
+                <a:lumOff val="5000"/>
+              </a:schemeClr>
+            </a:solidFill>
+            <a:tailEnd type="triangle"/>
+          </a:ln>
+        </p:spPr>
+        <p:style>
+          <a:lnRef idx="3">
+            <a:schemeClr val="dk1"/>
+          </a:lnRef>
+          <a:fillRef idx="0">
+            <a:schemeClr val="dk1"/>
+          </a:fillRef>
+          <a:effectRef idx="2">
+            <a:schemeClr val="dk1"/>
+          </a:effectRef>
+          <a:fontRef idx="minor">
+            <a:schemeClr val="tx1"/>
+          </a:fontRef>
+        </p:style>
+      </p:cxnSp>
+      <p:cxnSp>
+        <p:nvCxnSpPr>
+          <p:cNvPr id="30" name="Straight Arrow Connector 29">
+            <a:extLst>
+              <a:ext uri="{FF2B5EF4-FFF2-40B4-BE49-F238E27FC236}">
+                <a16:creationId xmlns:a16="http://schemas.microsoft.com/office/drawing/2014/main" id="{FC519833-EB11-A549-710F-BDE4E18BA431}"/>
+              </a:ext>
+            </a:extLst>
+          </p:cNvPr>
+          <p:cNvCxnSpPr>
+            <a:cxnSpLocks/>
+          </p:cNvCxnSpPr>
+          <p:nvPr/>
+        </p:nvCxnSpPr>
+        <p:spPr>
+          <a:xfrm flipV="1">
+            <a:off x="6142721" y="1978539"/>
+            <a:ext cx="747636" cy="2870022"/>
+          </a:xfrm>
+          <a:prstGeom prst="straightConnector1">
+            <a:avLst/>
+          </a:prstGeom>
+          <a:ln w="12700">
+            <a:solidFill>
+              <a:schemeClr val="tx1">
+                <a:lumMod val="95000"/>
+                <a:lumOff val="5000"/>
+              </a:schemeClr>
+            </a:solidFill>
+            <a:tailEnd type="triangle"/>
+          </a:ln>
+        </p:spPr>
+        <p:style>
+          <a:lnRef idx="3">
+            <a:schemeClr val="dk1"/>
+          </a:lnRef>
+          <a:fillRef idx="0">
+            <a:schemeClr val="dk1"/>
+          </a:fillRef>
+          <a:effectRef idx="2">
+            <a:schemeClr val="dk1"/>
+          </a:effectRef>
+          <a:fontRef idx="minor">
+            <a:schemeClr val="tx1"/>
+          </a:fontRef>
+        </p:style>
+      </p:cxnSp>
+      <p:cxnSp>
+        <p:nvCxnSpPr>
+          <p:cNvPr id="31" name="Straight Arrow Connector 30">
+            <a:extLst>
+              <a:ext uri="{FF2B5EF4-FFF2-40B4-BE49-F238E27FC236}">
+                <a16:creationId xmlns:a16="http://schemas.microsoft.com/office/drawing/2014/main" id="{756C5F3F-DB83-6F90-52B3-B450A7A5B134}"/>
+              </a:ext>
+            </a:extLst>
+          </p:cNvPr>
+          <p:cNvCxnSpPr>
+            <a:cxnSpLocks/>
+          </p:cNvCxnSpPr>
+          <p:nvPr/>
+        </p:nvCxnSpPr>
+        <p:spPr>
+          <a:xfrm>
+            <a:off x="6152697" y="1219202"/>
+            <a:ext cx="720319" cy="632009"/>
+          </a:xfrm>
+          <a:prstGeom prst="straightConnector1">
+            <a:avLst/>
+          </a:prstGeom>
+          <a:ln w="12700">
+            <a:solidFill>
+              <a:schemeClr val="tx1">
+                <a:lumMod val="95000"/>
+                <a:lumOff val="5000"/>
+              </a:schemeClr>
+            </a:solidFill>
+            <a:tailEnd type="triangle"/>
+          </a:ln>
+        </p:spPr>
+        <p:style>
+          <a:lnRef idx="3">
+            <a:schemeClr val="dk1"/>
+          </a:lnRef>
+          <a:fillRef idx="0">
+            <a:schemeClr val="dk1"/>
+          </a:fillRef>
+          <a:effectRef idx="2">
+            <a:schemeClr val="dk1"/>
+          </a:effectRef>
+          <a:fontRef idx="minor">
+            <a:schemeClr val="tx1"/>
+          </a:fontRef>
+        </p:style>
+      </p:cxnSp>
+      <p:cxnSp>
+        <p:nvCxnSpPr>
+          <p:cNvPr id="32" name="Straight Arrow Connector 31">
+            <a:extLst>
+              <a:ext uri="{FF2B5EF4-FFF2-40B4-BE49-F238E27FC236}">
+                <a16:creationId xmlns:a16="http://schemas.microsoft.com/office/drawing/2014/main" id="{4712EEE1-17A9-5163-83E0-D4CE476AAB29}"/>
+              </a:ext>
+            </a:extLst>
+          </p:cNvPr>
+          <p:cNvCxnSpPr>
+            <a:cxnSpLocks/>
+          </p:cNvCxnSpPr>
+          <p:nvPr/>
+        </p:nvCxnSpPr>
+        <p:spPr>
+          <a:xfrm>
+            <a:off x="6142721" y="1224971"/>
+            <a:ext cx="730295" cy="1616842"/>
+          </a:xfrm>
+          <a:prstGeom prst="straightConnector1">
+            <a:avLst/>
+          </a:prstGeom>
+          <a:ln w="12700">
+            <a:solidFill>
+              <a:schemeClr val="tx1">
+                <a:lumMod val="95000"/>
+                <a:lumOff val="5000"/>
+              </a:schemeClr>
+            </a:solidFill>
+            <a:tailEnd type="triangle"/>
+          </a:ln>
+        </p:spPr>
+        <p:style>
+          <a:lnRef idx="3">
+            <a:schemeClr val="dk1"/>
+          </a:lnRef>
+          <a:fillRef idx="0">
+            <a:schemeClr val="dk1"/>
+          </a:fillRef>
+          <a:effectRef idx="2">
+            <a:schemeClr val="dk1"/>
+          </a:effectRef>
+          <a:fontRef idx="minor">
+            <a:schemeClr val="tx1"/>
+          </a:fontRef>
+        </p:style>
+      </p:cxnSp>
+      <p:cxnSp>
+        <p:nvCxnSpPr>
+          <p:cNvPr id="33" name="Straight Arrow Connector 32">
+            <a:extLst>
+              <a:ext uri="{FF2B5EF4-FFF2-40B4-BE49-F238E27FC236}">
+                <a16:creationId xmlns:a16="http://schemas.microsoft.com/office/drawing/2014/main" id="{7BC9412F-30DB-A84C-283E-B54D91CDFD23}"/>
+              </a:ext>
+            </a:extLst>
+          </p:cNvPr>
+          <p:cNvCxnSpPr>
+            <a:cxnSpLocks/>
+          </p:cNvCxnSpPr>
+          <p:nvPr/>
+        </p:nvCxnSpPr>
+        <p:spPr>
+          <a:xfrm>
+            <a:off x="6142721" y="1205936"/>
+            <a:ext cx="730295" cy="2736742"/>
+          </a:xfrm>
+          <a:prstGeom prst="straightConnector1">
+            <a:avLst/>
+          </a:prstGeom>
+          <a:ln w="12700">
+            <a:solidFill>
+              <a:schemeClr val="tx1">
+                <a:lumMod val="95000"/>
+                <a:lumOff val="5000"/>
+              </a:schemeClr>
+            </a:solidFill>
+            <a:tailEnd type="triangle"/>
+          </a:ln>
+        </p:spPr>
+        <p:style>
+          <a:lnRef idx="3">
+            <a:schemeClr val="dk1"/>
+          </a:lnRef>
+          <a:fillRef idx="0">
+            <a:schemeClr val="dk1"/>
+          </a:fillRef>
+          <a:effectRef idx="2">
+            <a:schemeClr val="dk1"/>
+          </a:effectRef>
+          <a:fontRef idx="minor">
+            <a:schemeClr val="tx1"/>
+          </a:fontRef>
+        </p:style>
+      </p:cxnSp>
+      <p:cxnSp>
+        <p:nvCxnSpPr>
+          <p:cNvPr id="34" name="Straight Arrow Connector 33">
+            <a:extLst>
+              <a:ext uri="{FF2B5EF4-FFF2-40B4-BE49-F238E27FC236}">
+                <a16:creationId xmlns:a16="http://schemas.microsoft.com/office/drawing/2014/main" id="{743E2908-68FD-FFAD-A523-CDA888EEFE26}"/>
+              </a:ext>
+            </a:extLst>
+          </p:cNvPr>
+          <p:cNvCxnSpPr>
+            <a:cxnSpLocks/>
+          </p:cNvCxnSpPr>
+          <p:nvPr/>
+        </p:nvCxnSpPr>
+        <p:spPr>
+          <a:xfrm flipV="1">
+            <a:off x="6134210" y="1894243"/>
+            <a:ext cx="708998" cy="539676"/>
+          </a:xfrm>
+          <a:prstGeom prst="straightConnector1">
+            <a:avLst/>
+          </a:prstGeom>
+          <a:ln w="12700">
+            <a:solidFill>
+              <a:schemeClr val="tx1">
+                <a:lumMod val="95000"/>
+                <a:lumOff val="5000"/>
+              </a:schemeClr>
+            </a:solidFill>
+            <a:tailEnd type="triangle"/>
+          </a:ln>
+        </p:spPr>
+        <p:style>
+          <a:lnRef idx="3">
+            <a:schemeClr val="dk1"/>
+          </a:lnRef>
+          <a:fillRef idx="0">
+            <a:schemeClr val="dk1"/>
+          </a:fillRef>
+          <a:effectRef idx="2">
+            <a:schemeClr val="dk1"/>
+          </a:effectRef>
+          <a:fontRef idx="minor">
+            <a:schemeClr val="tx1"/>
+          </a:fontRef>
+        </p:style>
+      </p:cxnSp>
+      <p:cxnSp>
+        <p:nvCxnSpPr>
+          <p:cNvPr id="35" name="Straight Arrow Connector 34">
+            <a:extLst>
+              <a:ext uri="{FF2B5EF4-FFF2-40B4-BE49-F238E27FC236}">
+                <a16:creationId xmlns:a16="http://schemas.microsoft.com/office/drawing/2014/main" id="{3C830E14-782C-621F-43AE-1974BAC80F83}"/>
+              </a:ext>
+            </a:extLst>
+          </p:cNvPr>
+          <p:cNvCxnSpPr>
+            <a:cxnSpLocks/>
+          </p:cNvCxnSpPr>
+          <p:nvPr/>
+        </p:nvCxnSpPr>
+        <p:spPr>
+          <a:xfrm>
+            <a:off x="6142721" y="2433919"/>
+            <a:ext cx="730295" cy="464898"/>
+          </a:xfrm>
+          <a:prstGeom prst="straightConnector1">
+            <a:avLst/>
+          </a:prstGeom>
+          <a:ln w="12700">
+            <a:solidFill>
+              <a:schemeClr val="tx1">
+                <a:lumMod val="95000"/>
+                <a:lumOff val="5000"/>
+              </a:schemeClr>
+            </a:solidFill>
+            <a:tailEnd type="triangle"/>
+          </a:ln>
+        </p:spPr>
+        <p:style>
+          <a:lnRef idx="3">
+            <a:schemeClr val="dk1"/>
+          </a:lnRef>
+          <a:fillRef idx="0">
+            <a:schemeClr val="dk1"/>
+          </a:fillRef>
+          <a:effectRef idx="2">
+            <a:schemeClr val="dk1"/>
+          </a:effectRef>
+          <a:fontRef idx="minor">
+            <a:schemeClr val="tx1"/>
+          </a:fontRef>
+        </p:style>
+      </p:cxnSp>
+      <p:cxnSp>
+        <p:nvCxnSpPr>
+          <p:cNvPr id="36" name="Straight Arrow Connector 35">
+            <a:extLst>
+              <a:ext uri="{FF2B5EF4-FFF2-40B4-BE49-F238E27FC236}">
+                <a16:creationId xmlns:a16="http://schemas.microsoft.com/office/drawing/2014/main" id="{F46A1508-26A7-D73E-8928-DE2ECF7DA059}"/>
+              </a:ext>
+            </a:extLst>
+          </p:cNvPr>
+          <p:cNvCxnSpPr>
+            <a:cxnSpLocks/>
+          </p:cNvCxnSpPr>
+          <p:nvPr/>
+        </p:nvCxnSpPr>
+        <p:spPr>
+          <a:xfrm>
+            <a:off x="6142721" y="2433919"/>
+            <a:ext cx="700487" cy="1540507"/>
+          </a:xfrm>
+          <a:prstGeom prst="straightConnector1">
+            <a:avLst/>
+          </a:prstGeom>
+          <a:ln w="12700">
+            <a:solidFill>
+              <a:schemeClr val="tx1">
+                <a:lumMod val="95000"/>
+                <a:lumOff val="5000"/>
+              </a:schemeClr>
+            </a:solidFill>
+            <a:tailEnd type="triangle"/>
+          </a:ln>
+        </p:spPr>
+        <p:style>
+          <a:lnRef idx="3">
+            <a:schemeClr val="dk1"/>
+          </a:lnRef>
+          <a:fillRef idx="0">
+            <a:schemeClr val="dk1"/>
+          </a:fillRef>
+          <a:effectRef idx="2">
+            <a:schemeClr val="dk1"/>
+          </a:effectRef>
+          <a:fontRef idx="minor">
+            <a:schemeClr val="tx1"/>
+          </a:fontRef>
+        </p:style>
+      </p:cxnSp>
+      <p:cxnSp>
+        <p:nvCxnSpPr>
+          <p:cNvPr id="37" name="Straight Arrow Connector 36">
+            <a:extLst>
+              <a:ext uri="{FF2B5EF4-FFF2-40B4-BE49-F238E27FC236}">
+                <a16:creationId xmlns:a16="http://schemas.microsoft.com/office/drawing/2014/main" id="{7C988024-7B39-1357-6F52-C02F1B73DFBB}"/>
+              </a:ext>
+            </a:extLst>
+          </p:cNvPr>
+          <p:cNvCxnSpPr>
+            <a:cxnSpLocks/>
+          </p:cNvCxnSpPr>
+          <p:nvPr/>
+        </p:nvCxnSpPr>
+        <p:spPr>
+          <a:xfrm>
+            <a:off x="7802202" y="1847177"/>
+            <a:ext cx="930766" cy="1051640"/>
+          </a:xfrm>
+          <a:prstGeom prst="straightConnector1">
+            <a:avLst/>
+          </a:prstGeom>
+          <a:ln w="12700">
+            <a:solidFill>
+              <a:schemeClr val="tx1">
+                <a:lumMod val="95000"/>
+                <a:lumOff val="5000"/>
+              </a:schemeClr>
+            </a:solidFill>
+            <a:tailEnd type="triangle"/>
+          </a:ln>
+        </p:spPr>
+        <p:style>
+          <a:lnRef idx="3">
+            <a:schemeClr val="dk1"/>
+          </a:lnRef>
+          <a:fillRef idx="0">
+            <a:schemeClr val="dk1"/>
+          </a:fillRef>
+          <a:effectRef idx="2">
+            <a:schemeClr val="dk1"/>
+          </a:effectRef>
+          <a:fontRef idx="minor">
+            <a:schemeClr val="tx1"/>
+          </a:fontRef>
+        </p:style>
+      </p:cxnSp>
+      <p:sp>
+        <p:nvSpPr>
+          <p:cNvPr id="38" name="Oval 37">
+            <a:extLst>
+              <a:ext uri="{FF2B5EF4-FFF2-40B4-BE49-F238E27FC236}">
+                <a16:creationId xmlns:a16="http://schemas.microsoft.com/office/drawing/2014/main" id="{B2C51ED9-4B48-1223-0D98-2E939BA9BE3D}"/>
+              </a:ext>
+            </a:extLst>
+          </p:cNvPr>
+          <p:cNvSpPr/>
+          <p:nvPr/>
+        </p:nvSpPr>
+        <p:spPr>
+          <a:xfrm>
+            <a:off x="8788523" y="2541495"/>
+            <a:ext cx="815788" cy="815788"/>
+          </a:xfrm>
+          <a:prstGeom prst="ellipse">
+            <a:avLst/>
+          </a:prstGeom>
+          <a:solidFill>
+            <a:srgbClr val="FFFFFF"/>
+          </a:solidFill>
+          <a:ln w="31750">
+            <a:solidFill>
+              <a:schemeClr val="tx1">
+                <a:lumMod val="95000"/>
+                <a:lumOff val="5000"/>
+              </a:schemeClr>
+            </a:solidFill>
+          </a:ln>
+        </p:spPr>
+        <p:style>
+          <a:lnRef idx="2">
+            <a:schemeClr val="accent5">
+              <a:shade val="15000"/>
+            </a:schemeClr>
+          </a:lnRef>
+          <a:fillRef idx="1">
+            <a:schemeClr val="accent5"/>
+          </a:fillRef>
+          <a:effectRef idx="0">
+            <a:schemeClr val="accent5"/>
+          </a:effectRef>
+          <a:fontRef idx="minor">
+            <a:schemeClr val="lt1"/>
+          </a:fontRef>
+        </p:style>
+        <p:txBody>
+          <a:bodyPr rtlCol="0" anchor="ctr"/>
+          <a:lstStyle/>
+          <a:p>
+            <a:pPr algn="ctr"/>
+            <a:endParaRPr lang="en-GB"/>
+          </a:p>
+        </p:txBody>
+      </p:sp>
+      <p:cxnSp>
+        <p:nvCxnSpPr>
+          <p:cNvPr id="39" name="Straight Arrow Connector 38">
+            <a:extLst>
+              <a:ext uri="{FF2B5EF4-FFF2-40B4-BE49-F238E27FC236}">
+                <a16:creationId xmlns:a16="http://schemas.microsoft.com/office/drawing/2014/main" id="{32E3944C-E6BF-2662-928F-1CF3A58549AC}"/>
+              </a:ext>
+            </a:extLst>
+          </p:cNvPr>
+          <p:cNvCxnSpPr>
+            <a:cxnSpLocks/>
+          </p:cNvCxnSpPr>
+          <p:nvPr/>
+        </p:nvCxnSpPr>
+        <p:spPr>
+          <a:xfrm>
+            <a:off x="7801058" y="2949389"/>
+            <a:ext cx="931910" cy="0"/>
+          </a:xfrm>
+          <a:prstGeom prst="straightConnector1">
+            <a:avLst/>
+          </a:prstGeom>
+          <a:ln w="12700">
+            <a:solidFill>
+              <a:schemeClr val="tx1">
+                <a:lumMod val="95000"/>
+                <a:lumOff val="5000"/>
+              </a:schemeClr>
+            </a:solidFill>
+            <a:tailEnd type="triangle"/>
+          </a:ln>
+        </p:spPr>
+        <p:style>
+          <a:lnRef idx="3">
+            <a:schemeClr val="dk1"/>
+          </a:lnRef>
+          <a:fillRef idx="0">
+            <a:schemeClr val="dk1"/>
+          </a:fillRef>
+          <a:effectRef idx="2">
+            <a:schemeClr val="dk1"/>
+          </a:effectRef>
+          <a:fontRef idx="minor">
+            <a:schemeClr val="tx1"/>
+          </a:fontRef>
+        </p:style>
+      </p:cxnSp>
+      <p:cxnSp>
+        <p:nvCxnSpPr>
+          <p:cNvPr id="40" name="Straight Arrow Connector 39">
+            <a:extLst>
+              <a:ext uri="{FF2B5EF4-FFF2-40B4-BE49-F238E27FC236}">
+                <a16:creationId xmlns:a16="http://schemas.microsoft.com/office/drawing/2014/main" id="{E7706028-55F6-4075-9751-EAE50C1D6431}"/>
+              </a:ext>
+            </a:extLst>
+          </p:cNvPr>
+          <p:cNvCxnSpPr>
+            <a:cxnSpLocks/>
+          </p:cNvCxnSpPr>
+          <p:nvPr/>
+        </p:nvCxnSpPr>
+        <p:spPr>
+          <a:xfrm flipV="1">
+            <a:off x="7802202" y="2999962"/>
+            <a:ext cx="930766" cy="1047603"/>
+          </a:xfrm>
+          <a:prstGeom prst="straightConnector1">
+            <a:avLst/>
+          </a:prstGeom>
+          <a:ln w="12700">
+            <a:solidFill>
+              <a:schemeClr val="tx1">
+                <a:lumMod val="95000"/>
+                <a:lumOff val="5000"/>
+              </a:schemeClr>
+            </a:solidFill>
+            <a:tailEnd type="triangle"/>
+          </a:ln>
+        </p:spPr>
+        <p:style>
+          <a:lnRef idx="3">
+            <a:schemeClr val="dk1"/>
+          </a:lnRef>
+          <a:fillRef idx="0">
+            <a:schemeClr val="dk1"/>
+          </a:fillRef>
+          <a:effectRef idx="2">
+            <a:schemeClr val="dk1"/>
+          </a:effectRef>
+          <a:fontRef idx="minor">
+            <a:schemeClr val="tx1"/>
+          </a:fontRef>
+        </p:style>
+      </p:cxnSp>
+      <p:sp>
+        <p:nvSpPr>
+          <p:cNvPr id="41" name="Oval 40">
+            <a:extLst>
+              <a:ext uri="{FF2B5EF4-FFF2-40B4-BE49-F238E27FC236}">
+                <a16:creationId xmlns:a16="http://schemas.microsoft.com/office/drawing/2014/main" id="{0AB1A2C7-E72E-84DF-0B9E-01EF28D982A7}"/>
+              </a:ext>
+            </a:extLst>
+          </p:cNvPr>
+          <p:cNvSpPr/>
+          <p:nvPr/>
+        </p:nvSpPr>
+        <p:spPr>
+          <a:xfrm>
+            <a:off x="5287575" y="4315794"/>
+            <a:ext cx="815788" cy="815788"/>
+          </a:xfrm>
+          <a:prstGeom prst="ellipse">
+            <a:avLst/>
+          </a:prstGeom>
+          <a:solidFill>
+            <a:srgbClr val="FFFFFF"/>
+          </a:solidFill>
+          <a:ln w="31750">
+            <a:solidFill>
+              <a:schemeClr val="tx1">
+                <a:lumMod val="95000"/>
+                <a:lumOff val="5000"/>
+              </a:schemeClr>
+            </a:solidFill>
+          </a:ln>
+        </p:spPr>
+        <p:style>
+          <a:lnRef idx="2">
+            <a:schemeClr val="accent5">
+              <a:shade val="15000"/>
+            </a:schemeClr>
+          </a:lnRef>
+          <a:fillRef idx="1">
+            <a:schemeClr val="accent5"/>
+          </a:fillRef>
+          <a:effectRef idx="0">
+            <a:schemeClr val="accent5"/>
+          </a:effectRef>
+          <a:fontRef idx="minor">
+            <a:schemeClr val="lt1"/>
+          </a:fontRef>
+        </p:style>
+        <p:txBody>
+          <a:bodyPr rtlCol="0" anchor="ctr"/>
+          <a:lstStyle/>
+          <a:p>
+            <a:pPr algn="ctr"/>
+            <a:endParaRPr lang="en-GB"/>
+          </a:p>
+        </p:txBody>
+      </p:sp>
+      <p:cxnSp>
+        <p:nvCxnSpPr>
+          <p:cNvPr id="42" name="Straight Arrow Connector 41">
+            <a:extLst>
+              <a:ext uri="{FF2B5EF4-FFF2-40B4-BE49-F238E27FC236}">
+                <a16:creationId xmlns:a16="http://schemas.microsoft.com/office/drawing/2014/main" id="{E18064BF-A8CF-2EF0-A12B-95ADFA2BD487}"/>
+              </a:ext>
+            </a:extLst>
+          </p:cNvPr>
+          <p:cNvCxnSpPr>
+            <a:cxnSpLocks/>
+          </p:cNvCxnSpPr>
+          <p:nvPr/>
+        </p:nvCxnSpPr>
+        <p:spPr>
+          <a:xfrm>
+            <a:off x="9692611" y="2958354"/>
+            <a:ext cx="931910" cy="0"/>
+          </a:xfrm>
+          <a:prstGeom prst="straightConnector1">
+            <a:avLst/>
+          </a:prstGeom>
+          <a:ln w="12700">
+            <a:solidFill>
+              <a:schemeClr val="tx1">
+                <a:lumMod val="95000"/>
+                <a:lumOff val="5000"/>
+              </a:schemeClr>
+            </a:solidFill>
+            <a:tailEnd type="triangle"/>
+          </a:ln>
+        </p:spPr>
+        <p:style>
+          <a:lnRef idx="3">
+            <a:schemeClr val="dk1"/>
+          </a:lnRef>
+          <a:fillRef idx="0">
+            <a:schemeClr val="dk1"/>
+          </a:fillRef>
+          <a:effectRef idx="2">
+            <a:schemeClr val="dk1"/>
+          </a:effectRef>
+          <a:fontRef idx="minor">
+            <a:schemeClr val="tx1"/>
+          </a:fontRef>
+        </p:style>
+      </p:cxnSp>
+      <p:sp>
+        <p:nvSpPr>
+          <p:cNvPr id="43" name="TextBox 42">
+            <a:extLst>
+              <a:ext uri="{FF2B5EF4-FFF2-40B4-BE49-F238E27FC236}">
+                <a16:creationId xmlns:a16="http://schemas.microsoft.com/office/drawing/2014/main" id="{AA176F73-F4B7-81E9-0B4C-56743422A991}"/>
+              </a:ext>
+            </a:extLst>
+          </p:cNvPr>
+          <p:cNvSpPr txBox="1"/>
+          <p:nvPr/>
+        </p:nvSpPr>
+        <p:spPr>
+          <a:xfrm>
+            <a:off x="1103895" y="2721757"/>
+            <a:ext cx="774571" cy="369332"/>
+          </a:xfrm>
+          <a:prstGeom prst="rect">
+            <a:avLst/>
+          </a:prstGeom>
+          <a:noFill/>
+        </p:spPr>
+        <p:txBody>
+          <a:bodyPr wrap="none" rtlCol="0">
+            <a:spAutoFit/>
+          </a:bodyPr>
+          <a:lstStyle/>
+          <a:p>
+            <a:r>
+              <a:rPr lang="en-US" dirty="0"/>
+              <a:t>Inputs</a:t>
+            </a:r>
+            <a:endParaRPr lang="en-GB" dirty="0"/>
+          </a:p>
+        </p:txBody>
+      </p:sp>
+      <p:cxnSp>
+        <p:nvCxnSpPr>
+          <p:cNvPr id="44" name="Straight Arrow Connector 43">
+            <a:extLst>
+              <a:ext uri="{FF2B5EF4-FFF2-40B4-BE49-F238E27FC236}">
+                <a16:creationId xmlns:a16="http://schemas.microsoft.com/office/drawing/2014/main" id="{534F7B11-07FD-1F29-371D-C20B222E0912}"/>
+              </a:ext>
+            </a:extLst>
+          </p:cNvPr>
+          <p:cNvCxnSpPr>
+            <a:cxnSpLocks/>
+          </p:cNvCxnSpPr>
+          <p:nvPr/>
+        </p:nvCxnSpPr>
+        <p:spPr>
+          <a:xfrm>
+            <a:off x="2070847" y="1359554"/>
+            <a:ext cx="1478200" cy="452577"/>
+          </a:xfrm>
+          <a:prstGeom prst="straightConnector1">
+            <a:avLst/>
+          </a:prstGeom>
+          <a:ln w="12700">
+            <a:solidFill>
+              <a:schemeClr val="tx1">
+                <a:lumMod val="95000"/>
+                <a:lumOff val="5000"/>
+              </a:schemeClr>
+            </a:solidFill>
+            <a:tailEnd type="triangle"/>
+          </a:ln>
+        </p:spPr>
+        <p:style>
+          <a:lnRef idx="3">
+            <a:schemeClr val="dk1"/>
+          </a:lnRef>
+          <a:fillRef idx="0">
+            <a:schemeClr val="dk1"/>
+          </a:fillRef>
+          <a:effectRef idx="2">
+            <a:schemeClr val="dk1"/>
+          </a:effectRef>
+          <a:fontRef idx="minor">
+            <a:schemeClr val="tx1"/>
+          </a:fontRef>
+        </p:style>
+      </p:cxnSp>
+      <p:cxnSp>
+        <p:nvCxnSpPr>
+          <p:cNvPr id="45" name="Straight Arrow Connector 44">
+            <a:extLst>
+              <a:ext uri="{FF2B5EF4-FFF2-40B4-BE49-F238E27FC236}">
+                <a16:creationId xmlns:a16="http://schemas.microsoft.com/office/drawing/2014/main" id="{4FBBAFFF-B6E6-ED2E-5620-9B95A170BE04}"/>
+              </a:ext>
+            </a:extLst>
+          </p:cNvPr>
+          <p:cNvCxnSpPr>
+            <a:cxnSpLocks/>
+          </p:cNvCxnSpPr>
+          <p:nvPr/>
+        </p:nvCxnSpPr>
+        <p:spPr>
+          <a:xfrm>
+            <a:off x="2077233" y="1362002"/>
+            <a:ext cx="1471814" cy="1536815"/>
+          </a:xfrm>
+          <a:prstGeom prst="straightConnector1">
+            <a:avLst/>
+          </a:prstGeom>
+          <a:ln w="12700">
+            <a:solidFill>
+              <a:schemeClr val="tx1">
+                <a:lumMod val="95000"/>
+                <a:lumOff val="5000"/>
+              </a:schemeClr>
+            </a:solidFill>
+            <a:tailEnd type="triangle"/>
+          </a:ln>
+        </p:spPr>
+        <p:style>
+          <a:lnRef idx="3">
+            <a:schemeClr val="dk1"/>
+          </a:lnRef>
+          <a:fillRef idx="0">
+            <a:schemeClr val="dk1"/>
+          </a:fillRef>
+          <a:effectRef idx="2">
+            <a:schemeClr val="dk1"/>
+          </a:effectRef>
+          <a:fontRef idx="minor">
+            <a:schemeClr val="tx1"/>
+          </a:fontRef>
+        </p:style>
+      </p:cxnSp>
+      <p:cxnSp>
+        <p:nvCxnSpPr>
+          <p:cNvPr id="46" name="Straight Arrow Connector 45">
+            <a:extLst>
+              <a:ext uri="{FF2B5EF4-FFF2-40B4-BE49-F238E27FC236}">
+                <a16:creationId xmlns:a16="http://schemas.microsoft.com/office/drawing/2014/main" id="{70E7A4C0-D84B-7102-9D0E-1A8A4E6415A0}"/>
+              </a:ext>
+            </a:extLst>
+          </p:cNvPr>
+          <p:cNvCxnSpPr>
+            <a:cxnSpLocks/>
+          </p:cNvCxnSpPr>
+          <p:nvPr/>
+        </p:nvCxnSpPr>
+        <p:spPr>
+          <a:xfrm>
+            <a:off x="2077233" y="1359554"/>
+            <a:ext cx="1471814" cy="2698098"/>
+          </a:xfrm>
+          <a:prstGeom prst="straightConnector1">
+            <a:avLst/>
+          </a:prstGeom>
+          <a:ln w="12700">
+            <a:solidFill>
+              <a:schemeClr val="tx1">
+                <a:lumMod val="95000"/>
+                <a:lumOff val="5000"/>
+              </a:schemeClr>
+            </a:solidFill>
+            <a:tailEnd type="triangle"/>
+          </a:ln>
+        </p:spPr>
+        <p:style>
+          <a:lnRef idx="3">
+            <a:schemeClr val="dk1"/>
+          </a:lnRef>
+          <a:fillRef idx="0">
+            <a:schemeClr val="dk1"/>
+          </a:fillRef>
+          <a:effectRef idx="2">
+            <a:schemeClr val="dk1"/>
+          </a:effectRef>
+          <a:fontRef idx="minor">
+            <a:schemeClr val="tx1"/>
+          </a:fontRef>
+        </p:style>
+      </p:cxnSp>
+      <p:cxnSp>
+        <p:nvCxnSpPr>
+          <p:cNvPr id="47" name="Straight Arrow Connector 46">
+            <a:extLst>
+              <a:ext uri="{FF2B5EF4-FFF2-40B4-BE49-F238E27FC236}">
+                <a16:creationId xmlns:a16="http://schemas.microsoft.com/office/drawing/2014/main" id="{754252FE-A537-90BE-7BF2-596379C696DB}"/>
+              </a:ext>
+            </a:extLst>
+          </p:cNvPr>
+          <p:cNvCxnSpPr>
+            <a:cxnSpLocks/>
+          </p:cNvCxnSpPr>
+          <p:nvPr/>
+        </p:nvCxnSpPr>
+        <p:spPr>
+          <a:xfrm flipV="1">
+            <a:off x="2089365" y="1825971"/>
+            <a:ext cx="1418216" cy="387820"/>
+          </a:xfrm>
+          <a:prstGeom prst="straightConnector1">
+            <a:avLst/>
+          </a:prstGeom>
+          <a:ln w="12700">
+            <a:solidFill>
+              <a:schemeClr val="tx1">
+                <a:lumMod val="95000"/>
+                <a:lumOff val="5000"/>
+              </a:schemeClr>
+            </a:solidFill>
+            <a:tailEnd type="triangle"/>
+          </a:ln>
+        </p:spPr>
+        <p:style>
+          <a:lnRef idx="3">
+            <a:schemeClr val="dk1"/>
+          </a:lnRef>
+          <a:fillRef idx="0">
+            <a:schemeClr val="dk1"/>
+          </a:fillRef>
+          <a:effectRef idx="2">
+            <a:schemeClr val="dk1"/>
+          </a:effectRef>
+          <a:fontRef idx="minor">
+            <a:schemeClr val="tx1"/>
+          </a:fontRef>
+        </p:style>
+      </p:cxnSp>
+      <p:cxnSp>
+        <p:nvCxnSpPr>
+          <p:cNvPr id="48" name="Straight Arrow Connector 47">
+            <a:extLst>
+              <a:ext uri="{FF2B5EF4-FFF2-40B4-BE49-F238E27FC236}">
+                <a16:creationId xmlns:a16="http://schemas.microsoft.com/office/drawing/2014/main" id="{53EBA86B-18EE-3CC6-9B53-51CC9F8E32E7}"/>
+              </a:ext>
+            </a:extLst>
+          </p:cNvPr>
+          <p:cNvCxnSpPr>
+            <a:cxnSpLocks/>
+          </p:cNvCxnSpPr>
+          <p:nvPr/>
+        </p:nvCxnSpPr>
+        <p:spPr>
+          <a:xfrm flipV="1">
+            <a:off x="2079518" y="4040379"/>
+            <a:ext cx="1478200" cy="452577"/>
+          </a:xfrm>
+          <a:prstGeom prst="straightConnector1">
+            <a:avLst/>
+          </a:prstGeom>
+          <a:ln w="12700">
+            <a:solidFill>
+              <a:schemeClr val="tx1">
+                <a:lumMod val="95000"/>
+                <a:lumOff val="5000"/>
+              </a:schemeClr>
+            </a:solidFill>
+            <a:tailEnd type="triangle"/>
+          </a:ln>
+        </p:spPr>
+        <p:style>
+          <a:lnRef idx="3">
+            <a:schemeClr val="dk1"/>
+          </a:lnRef>
+          <a:fillRef idx="0">
+            <a:schemeClr val="dk1"/>
+          </a:fillRef>
+          <a:effectRef idx="2">
+            <a:schemeClr val="dk1"/>
+          </a:effectRef>
+          <a:fontRef idx="minor">
+            <a:schemeClr val="tx1"/>
+          </a:fontRef>
+        </p:style>
+      </p:cxnSp>
+      <p:cxnSp>
+        <p:nvCxnSpPr>
+          <p:cNvPr id="49" name="Straight Arrow Connector 48">
+            <a:extLst>
+              <a:ext uri="{FF2B5EF4-FFF2-40B4-BE49-F238E27FC236}">
+                <a16:creationId xmlns:a16="http://schemas.microsoft.com/office/drawing/2014/main" id="{14BD3931-2898-0A32-93A0-72222B7441EC}"/>
+              </a:ext>
+            </a:extLst>
+          </p:cNvPr>
+          <p:cNvCxnSpPr>
+            <a:cxnSpLocks/>
+          </p:cNvCxnSpPr>
+          <p:nvPr/>
+        </p:nvCxnSpPr>
+        <p:spPr>
+          <a:xfrm>
+            <a:off x="2104262" y="3624879"/>
+            <a:ext cx="1403319" cy="407894"/>
+          </a:xfrm>
+          <a:prstGeom prst="straightConnector1">
+            <a:avLst/>
+          </a:prstGeom>
+          <a:ln w="12700">
+            <a:solidFill>
+              <a:schemeClr val="tx1">
+                <a:lumMod val="95000"/>
+                <a:lumOff val="5000"/>
+              </a:schemeClr>
+            </a:solidFill>
+            <a:tailEnd type="triangle"/>
+          </a:ln>
+        </p:spPr>
+        <p:style>
+          <a:lnRef idx="3">
+            <a:schemeClr val="dk1"/>
+          </a:lnRef>
+          <a:fillRef idx="0">
+            <a:schemeClr val="dk1"/>
+          </a:fillRef>
+          <a:effectRef idx="2">
+            <a:schemeClr val="dk1"/>
+          </a:effectRef>
+          <a:fontRef idx="minor">
+            <a:schemeClr val="tx1"/>
+          </a:fontRef>
+        </p:style>
+      </p:cxnSp>
+      <p:cxnSp>
+        <p:nvCxnSpPr>
+          <p:cNvPr id="50" name="Straight Arrow Connector 49">
+            <a:extLst>
+              <a:ext uri="{FF2B5EF4-FFF2-40B4-BE49-F238E27FC236}">
+                <a16:creationId xmlns:a16="http://schemas.microsoft.com/office/drawing/2014/main" id="{B1B7903B-57C3-1946-98C2-6E462F4715F2}"/>
+              </a:ext>
+            </a:extLst>
+          </p:cNvPr>
+          <p:cNvCxnSpPr>
+            <a:cxnSpLocks/>
+          </p:cNvCxnSpPr>
+          <p:nvPr/>
+        </p:nvCxnSpPr>
+        <p:spPr>
+          <a:xfrm flipV="1">
+            <a:off x="2085507" y="1799432"/>
+            <a:ext cx="1471814" cy="2698098"/>
+          </a:xfrm>
+          <a:prstGeom prst="straightConnector1">
+            <a:avLst/>
+          </a:prstGeom>
+          <a:ln w="12700">
+            <a:solidFill>
+              <a:schemeClr val="tx1">
+                <a:lumMod val="95000"/>
+                <a:lumOff val="5000"/>
+              </a:schemeClr>
+            </a:solidFill>
+            <a:tailEnd type="triangle"/>
+          </a:ln>
+        </p:spPr>
+        <p:style>
+          <a:lnRef idx="3">
+            <a:schemeClr val="dk1"/>
+          </a:lnRef>
+          <a:fillRef idx="0">
+            <a:schemeClr val="dk1"/>
+          </a:fillRef>
+          <a:effectRef idx="2">
+            <a:schemeClr val="dk1"/>
+          </a:effectRef>
+          <a:fontRef idx="minor">
+            <a:schemeClr val="tx1"/>
+          </a:fontRef>
+        </p:style>
+      </p:cxnSp>
+      <p:cxnSp>
+        <p:nvCxnSpPr>
+          <p:cNvPr id="51" name="Straight Arrow Connector 50">
+            <a:extLst>
+              <a:ext uri="{FF2B5EF4-FFF2-40B4-BE49-F238E27FC236}">
+                <a16:creationId xmlns:a16="http://schemas.microsoft.com/office/drawing/2014/main" id="{E85931FE-BCD4-8B5C-D54D-447504B17CF3}"/>
+              </a:ext>
+            </a:extLst>
+          </p:cNvPr>
+          <p:cNvCxnSpPr>
+            <a:cxnSpLocks/>
+          </p:cNvCxnSpPr>
+          <p:nvPr/>
+        </p:nvCxnSpPr>
+        <p:spPr>
+          <a:xfrm flipV="1">
+            <a:off x="2077233" y="2958354"/>
+            <a:ext cx="1471814" cy="1536815"/>
+          </a:xfrm>
+          <a:prstGeom prst="straightConnector1">
+            <a:avLst/>
+          </a:prstGeom>
+          <a:ln w="12700">
+            <a:solidFill>
+              <a:schemeClr val="tx1">
+                <a:lumMod val="95000"/>
+                <a:lumOff val="5000"/>
+              </a:schemeClr>
+            </a:solidFill>
+            <a:tailEnd type="triangle"/>
+          </a:ln>
+        </p:spPr>
+        <p:style>
+          <a:lnRef idx="3">
+            <a:schemeClr val="dk1"/>
+          </a:lnRef>
+          <a:fillRef idx="0">
+            <a:schemeClr val="dk1"/>
+          </a:fillRef>
+          <a:effectRef idx="2">
+            <a:schemeClr val="dk1"/>
+          </a:effectRef>
+          <a:fontRef idx="minor">
+            <a:schemeClr val="tx1"/>
+          </a:fontRef>
+        </p:style>
+      </p:cxnSp>
+      <p:cxnSp>
+        <p:nvCxnSpPr>
+          <p:cNvPr id="52" name="Straight Arrow Connector 51">
+            <a:extLst>
+              <a:ext uri="{FF2B5EF4-FFF2-40B4-BE49-F238E27FC236}">
+                <a16:creationId xmlns:a16="http://schemas.microsoft.com/office/drawing/2014/main" id="{56EBDEB1-5C11-57D1-76AE-4EAD442A43AE}"/>
+              </a:ext>
+            </a:extLst>
+          </p:cNvPr>
+          <p:cNvCxnSpPr>
+            <a:cxnSpLocks/>
+          </p:cNvCxnSpPr>
+          <p:nvPr/>
+        </p:nvCxnSpPr>
+        <p:spPr>
+          <a:xfrm>
+            <a:off x="2089365" y="2217234"/>
+            <a:ext cx="1441195" cy="689189"/>
+          </a:xfrm>
+          <a:prstGeom prst="straightConnector1">
+            <a:avLst/>
+          </a:prstGeom>
+          <a:ln w="12700">
+            <a:solidFill>
+              <a:schemeClr val="tx1">
+                <a:lumMod val="95000"/>
+                <a:lumOff val="5000"/>
+              </a:schemeClr>
+            </a:solidFill>
+            <a:tailEnd type="triangle"/>
+          </a:ln>
+        </p:spPr>
+        <p:style>
+          <a:lnRef idx="3">
+            <a:schemeClr val="dk1"/>
+          </a:lnRef>
+          <a:fillRef idx="0">
+            <a:schemeClr val="dk1"/>
+          </a:fillRef>
+          <a:effectRef idx="2">
+            <a:schemeClr val="dk1"/>
+          </a:effectRef>
+          <a:fontRef idx="minor">
+            <a:schemeClr val="tx1"/>
+          </a:fontRef>
+        </p:style>
+      </p:cxnSp>
+      <p:cxnSp>
+        <p:nvCxnSpPr>
+          <p:cNvPr id="53" name="Straight Arrow Connector 52">
+            <a:extLst>
+              <a:ext uri="{FF2B5EF4-FFF2-40B4-BE49-F238E27FC236}">
+                <a16:creationId xmlns:a16="http://schemas.microsoft.com/office/drawing/2014/main" id="{595AB0C8-68C7-4C4C-FD35-503451963B1C}"/>
+              </a:ext>
+            </a:extLst>
+          </p:cNvPr>
+          <p:cNvCxnSpPr>
+            <a:cxnSpLocks/>
+          </p:cNvCxnSpPr>
+          <p:nvPr/>
+        </p:nvCxnSpPr>
+        <p:spPr>
+          <a:xfrm flipV="1">
+            <a:off x="2089364" y="2935690"/>
+            <a:ext cx="1441195" cy="689189"/>
+          </a:xfrm>
+          <a:prstGeom prst="straightConnector1">
+            <a:avLst/>
+          </a:prstGeom>
+          <a:ln w="12700">
+            <a:solidFill>
+              <a:schemeClr val="tx1">
+                <a:lumMod val="95000"/>
+                <a:lumOff val="5000"/>
+              </a:schemeClr>
+            </a:solidFill>
+            <a:tailEnd type="triangle"/>
+          </a:ln>
+        </p:spPr>
+        <p:style>
+          <a:lnRef idx="3">
+            <a:schemeClr val="dk1"/>
+          </a:lnRef>
+          <a:fillRef idx="0">
+            <a:schemeClr val="dk1"/>
+          </a:fillRef>
+          <a:effectRef idx="2">
+            <a:schemeClr val="dk1"/>
+          </a:effectRef>
+          <a:fontRef idx="minor">
+            <a:schemeClr val="tx1"/>
+          </a:fontRef>
+        </p:style>
+      </p:cxnSp>
+      <p:cxnSp>
+        <p:nvCxnSpPr>
+          <p:cNvPr id="54" name="Straight Arrow Connector 53">
+            <a:extLst>
+              <a:ext uri="{FF2B5EF4-FFF2-40B4-BE49-F238E27FC236}">
+                <a16:creationId xmlns:a16="http://schemas.microsoft.com/office/drawing/2014/main" id="{F66F7447-88ED-6A66-9175-C0EFF80C8629}"/>
+              </a:ext>
+            </a:extLst>
+          </p:cNvPr>
+          <p:cNvCxnSpPr>
+            <a:cxnSpLocks/>
+          </p:cNvCxnSpPr>
+          <p:nvPr/>
+        </p:nvCxnSpPr>
+        <p:spPr>
+          <a:xfrm flipV="1">
+            <a:off x="2089364" y="2928084"/>
+            <a:ext cx="1441195" cy="3803"/>
+          </a:xfrm>
+          <a:prstGeom prst="straightConnector1">
+            <a:avLst/>
+          </a:prstGeom>
+          <a:ln w="12700">
+            <a:solidFill>
+              <a:schemeClr val="tx1">
+                <a:lumMod val="95000"/>
+                <a:lumOff val="5000"/>
+              </a:schemeClr>
+            </a:solidFill>
+            <a:tailEnd type="triangle"/>
+          </a:ln>
+        </p:spPr>
+        <p:style>
+          <a:lnRef idx="3">
+            <a:schemeClr val="dk1"/>
+          </a:lnRef>
+          <a:fillRef idx="0">
+            <a:schemeClr val="dk1"/>
+          </a:fillRef>
+          <a:effectRef idx="2">
+            <a:schemeClr val="dk1"/>
+          </a:effectRef>
+          <a:fontRef idx="minor">
+            <a:schemeClr val="tx1"/>
+          </a:fontRef>
+        </p:style>
+      </p:cxnSp>
+      <p:cxnSp>
+        <p:nvCxnSpPr>
+          <p:cNvPr id="55" name="Straight Arrow Connector 54">
+            <a:extLst>
+              <a:ext uri="{FF2B5EF4-FFF2-40B4-BE49-F238E27FC236}">
+                <a16:creationId xmlns:a16="http://schemas.microsoft.com/office/drawing/2014/main" id="{067A821F-DBC4-3B05-900B-2CE86C4CEB12}"/>
+              </a:ext>
+            </a:extLst>
+          </p:cNvPr>
+          <p:cNvCxnSpPr>
+            <a:cxnSpLocks/>
+          </p:cNvCxnSpPr>
+          <p:nvPr/>
+        </p:nvCxnSpPr>
+        <p:spPr>
+          <a:xfrm flipV="1">
+            <a:off x="2089364" y="1864062"/>
+            <a:ext cx="1397584" cy="1072436"/>
+          </a:xfrm>
+          <a:prstGeom prst="straightConnector1">
+            <a:avLst/>
+          </a:prstGeom>
+          <a:ln w="12700">
+            <a:solidFill>
+              <a:schemeClr val="tx1">
+                <a:lumMod val="95000"/>
+                <a:lumOff val="5000"/>
+              </a:schemeClr>
+            </a:solidFill>
+            <a:tailEnd type="triangle"/>
+          </a:ln>
+        </p:spPr>
+        <p:style>
+          <a:lnRef idx="3">
+            <a:schemeClr val="dk1"/>
+          </a:lnRef>
+          <a:fillRef idx="0">
+            <a:schemeClr val="dk1"/>
+          </a:fillRef>
+          <a:effectRef idx="2">
+            <a:schemeClr val="dk1"/>
+          </a:effectRef>
+          <a:fontRef idx="minor">
+            <a:schemeClr val="tx1"/>
+          </a:fontRef>
+        </p:style>
+      </p:cxnSp>
+      <p:cxnSp>
+        <p:nvCxnSpPr>
+          <p:cNvPr id="56" name="Straight Arrow Connector 55">
+            <a:extLst>
+              <a:ext uri="{FF2B5EF4-FFF2-40B4-BE49-F238E27FC236}">
+                <a16:creationId xmlns:a16="http://schemas.microsoft.com/office/drawing/2014/main" id="{F0E61932-285F-6344-FDC8-998C74170882}"/>
+              </a:ext>
+            </a:extLst>
+          </p:cNvPr>
+          <p:cNvCxnSpPr>
+            <a:cxnSpLocks/>
+          </p:cNvCxnSpPr>
+          <p:nvPr/>
+        </p:nvCxnSpPr>
+        <p:spPr>
+          <a:xfrm>
+            <a:off x="2089364" y="2926421"/>
+            <a:ext cx="1397584" cy="1072436"/>
+          </a:xfrm>
+          <a:prstGeom prst="straightConnector1">
+            <a:avLst/>
+          </a:prstGeom>
+          <a:ln w="12700">
+            <a:solidFill>
+              <a:schemeClr val="tx1">
+                <a:lumMod val="95000"/>
+                <a:lumOff val="5000"/>
+              </a:schemeClr>
+            </a:solidFill>
+            <a:tailEnd type="triangle"/>
+          </a:ln>
+        </p:spPr>
+        <p:style>
+          <a:lnRef idx="3">
+            <a:schemeClr val="dk1"/>
+          </a:lnRef>
+          <a:fillRef idx="0">
+            <a:schemeClr val="dk1"/>
+          </a:fillRef>
+          <a:effectRef idx="2">
+            <a:schemeClr val="dk1"/>
+          </a:effectRef>
+          <a:fontRef idx="minor">
+            <a:schemeClr val="tx1"/>
+          </a:fontRef>
+        </p:style>
+      </p:cxnSp>
+      <p:sp>
+        <p:nvSpPr>
+          <p:cNvPr id="57" name="TextBox 56">
+            <a:extLst>
+              <a:ext uri="{FF2B5EF4-FFF2-40B4-BE49-F238E27FC236}">
+                <a16:creationId xmlns:a16="http://schemas.microsoft.com/office/drawing/2014/main" id="{53A831A7-4A94-887D-8ADE-C304CBA0ACEA}"/>
+              </a:ext>
+            </a:extLst>
+          </p:cNvPr>
+          <p:cNvSpPr txBox="1"/>
+          <p:nvPr/>
+        </p:nvSpPr>
+        <p:spPr>
+          <a:xfrm>
+            <a:off x="10624521" y="2761136"/>
+            <a:ext cx="856325" cy="369332"/>
+          </a:xfrm>
+          <a:prstGeom prst="rect">
+            <a:avLst/>
+          </a:prstGeom>
+          <a:noFill/>
+        </p:spPr>
+        <p:txBody>
+          <a:bodyPr wrap="none" rtlCol="0">
+            <a:spAutoFit/>
+          </a:bodyPr>
+          <a:lstStyle/>
+          <a:p>
+            <a:r>
+              <a:rPr lang="en-US" dirty="0"/>
+              <a:t>Output</a:t>
+            </a:r>
+            <a:endParaRPr lang="en-GB" dirty="0"/>
+          </a:p>
+        </p:txBody>
+      </p:sp>
+      <p:sp>
+        <p:nvSpPr>
+          <p:cNvPr id="58" name="TextBox 57">
+            <a:extLst>
+              <a:ext uri="{FF2B5EF4-FFF2-40B4-BE49-F238E27FC236}">
+                <a16:creationId xmlns:a16="http://schemas.microsoft.com/office/drawing/2014/main" id="{3D2E1A35-BD71-084C-EECA-9CB02F8A3AD5}"/>
+              </a:ext>
+            </a:extLst>
+          </p:cNvPr>
+          <p:cNvSpPr txBox="1"/>
+          <p:nvPr/>
+        </p:nvSpPr>
+        <p:spPr>
+          <a:xfrm>
+            <a:off x="4998632" y="5677360"/>
+            <a:ext cx="1416670" cy="369332"/>
+          </a:xfrm>
+          <a:prstGeom prst="rect">
+            <a:avLst/>
+          </a:prstGeom>
+          <a:noFill/>
+        </p:spPr>
+        <p:txBody>
+          <a:bodyPr wrap="none" rtlCol="0">
+            <a:spAutoFit/>
+          </a:bodyPr>
+          <a:lstStyle/>
+          <a:p>
+            <a:r>
+              <a:rPr lang="en-US" dirty="0"/>
+              <a:t>Hidden Layer</a:t>
+            </a:r>
+            <a:endParaRPr lang="en-GB" dirty="0"/>
+          </a:p>
+        </p:txBody>
+      </p:sp>
+      <p:sp>
+        <p:nvSpPr>
+          <p:cNvPr id="60" name="Right Brace 59">
+            <a:extLst>
+              <a:ext uri="{FF2B5EF4-FFF2-40B4-BE49-F238E27FC236}">
+                <a16:creationId xmlns:a16="http://schemas.microsoft.com/office/drawing/2014/main" id="{01DEDAFE-FA0B-3B03-670E-2268BEDF0F6B}"/>
+              </a:ext>
+            </a:extLst>
+          </p:cNvPr>
+          <p:cNvSpPr/>
+          <p:nvPr/>
+        </p:nvSpPr>
+        <p:spPr>
+          <a:xfrm rot="5400000">
+            <a:off x="5387025" y="3320306"/>
+            <a:ext cx="639884" cy="4188182"/>
+          </a:xfrm>
+          <a:prstGeom prst="rightBrace">
+            <a:avLst>
+              <a:gd name="adj1" fmla="val 8333"/>
+              <a:gd name="adj2" fmla="val 49688"/>
+            </a:avLst>
+          </a:prstGeom>
+          <a:ln w="12700">
+            <a:solidFill>
+              <a:schemeClr val="tx1"/>
+            </a:solidFill>
+          </a:ln>
+        </p:spPr>
+        <p:style>
+          <a:lnRef idx="1">
+            <a:schemeClr val="accent1"/>
+          </a:lnRef>
+          <a:fillRef idx="0">
+            <a:schemeClr val="accent1"/>
+          </a:fillRef>
+          <a:effectRef idx="0">
+            <a:schemeClr val="accent1"/>
+          </a:effectRef>
+          <a:fontRef idx="minor">
+            <a:schemeClr val="tx1"/>
+          </a:fontRef>
+        </p:style>
+        <p:txBody>
+          <a:bodyPr rtlCol="0" anchor="ctr"/>
+          <a:lstStyle/>
+          <a:p>
+            <a:pPr algn="ctr"/>
+            <a:endParaRPr lang="en-GB"/>
+          </a:p>
+        </p:txBody>
+      </p:sp>
+    </p:spTree>
+    <p:extLst>
+      <p:ext uri="{BB962C8B-B14F-4D97-AF65-F5344CB8AC3E}">
+        <p14:creationId xmlns:p14="http://schemas.microsoft.com/office/powerpoint/2010/main" val="3450144847"/>
+      </p:ext>
+    </p:extLst>
+  </p:cSld>
+  <p:clrMapOvr>
+    <a:masterClrMapping/>
+  </p:clrMapOvr>
+</p:sld>
+</file>
+
+<file path=ppt/slides/slide4.xml><?xml version="1.0" encoding="utf-8"?>
 <p:sld xmlns:a="http://schemas.openxmlformats.org/drawingml/2006/main" xmlns:r="http://schemas.openxmlformats.org/officeDocument/2006/relationships" xmlns:p="http://schemas.openxmlformats.org/presentationml/2006/main">
   <p:cSld>
     <p:spTree>

</xml_diff>